<commit_message>
Adds more control tests and updates the presentation with control
</commit_message>
<xml_diff>
--- a/basic_erlang_4/presentation/erlang_part_4_testing.pptx
+++ b/basic_erlang_4/presentation/erlang_part_4_testing.pptx
@@ -5,10 +5,10 @@
     <p:sldMasterId id="2147483676" r:id="rId1"/>
   </p:sldMasterIdLst>
   <p:notesMasterIdLst>
-    <p:notesMasterId r:id="rId25"/>
+    <p:notesMasterId r:id="rId30"/>
   </p:notesMasterIdLst>
   <p:handoutMasterIdLst>
-    <p:handoutMasterId r:id="rId26"/>
+    <p:handoutMasterId r:id="rId31"/>
   </p:handoutMasterIdLst>
   <p:sldIdLst>
     <p:sldId id="259" r:id="rId2"/>
@@ -31,23 +31,28 @@
     <p:sldId id="277" r:id="rId19"/>
     <p:sldId id="278" r:id="rId20"/>
     <p:sldId id="279" r:id="rId21"/>
-    <p:sldId id="280" r:id="rId22"/>
-    <p:sldId id="281" r:id="rId23"/>
-    <p:sldId id="282" r:id="rId24"/>
+    <p:sldId id="287" r:id="rId22"/>
+    <p:sldId id="280" r:id="rId23"/>
+    <p:sldId id="281" r:id="rId24"/>
+    <p:sldId id="286" r:id="rId25"/>
+    <p:sldId id="284" r:id="rId26"/>
+    <p:sldId id="283" r:id="rId27"/>
+    <p:sldId id="285" r:id="rId28"/>
+    <p:sldId id="282" r:id="rId29"/>
   </p:sldIdLst>
   <p:sldSz cx="12192000" cy="6858000"/>
   <p:notesSz cx="6884988" cy="10018713"/>
   <p:embeddedFontLst>
     <p:embeddedFont>
       <p:font typeface="Consolas" panose="020B0609020204030204" pitchFamily="49" charset="0"/>
-      <p:regular r:id="rId27"/>
-      <p:bold r:id="rId28"/>
-      <p:italic r:id="rId29"/>
-      <p:boldItalic r:id="rId30"/>
+      <p:regular r:id="rId32"/>
+      <p:bold r:id="rId33"/>
+      <p:italic r:id="rId34"/>
+      <p:boldItalic r:id="rId35"/>
     </p:embeddedFont>
     <p:embeddedFont>
       <p:font typeface="Ericsson Capital TT" panose="02000503000000020004" pitchFamily="2" charset="0"/>
-      <p:regular r:id="rId31"/>
+      <p:regular r:id="rId36"/>
     </p:embeddedFont>
   </p:embeddedFontLst>
   <p:defaultTextStyle>
@@ -200,8 +205,13 @@
             <p14:sldId id="277"/>
             <p14:sldId id="278"/>
             <p14:sldId id="279"/>
+            <p14:sldId id="287"/>
             <p14:sldId id="280"/>
             <p14:sldId id="281"/>
+            <p14:sldId id="286"/>
+            <p14:sldId id="284"/>
+            <p14:sldId id="283"/>
+            <p14:sldId id="285"/>
             <p14:sldId id="282"/>
           </p14:sldIdLst>
         </p14:section>
@@ -1714,7 +1724,7 @@
             <a:fld id="{5852353D-F306-481A-B3D0-C36CE0BF9563}" type="slidenum">
               <a:rPr lang="en-US" smtClean="0"/>
               <a:pPr/>
-              <a:t>22</a:t>
+              <a:t>21</a:t>
             </a:fld>
             <a:endParaRPr lang="en-US" dirty="0"/>
           </a:p>
@@ -1769,7 +1779,7 @@
     </p:spTree>
     <p:extLst>
       <p:ext uri="{BB962C8B-B14F-4D97-AF65-F5344CB8AC3E}">
-        <p14:creationId xmlns:p14="http://schemas.microsoft.com/office/powerpoint/2010/main" val="2059806007"/>
+        <p14:creationId xmlns:p14="http://schemas.microsoft.com/office/powerpoint/2010/main" val="47537287"/>
       </p:ext>
     </p:extLst>
   </p:cSld>
@@ -1806,12 +1816,7 @@
             <p:ph type="sldImg"/>
           </p:nvPr>
         </p:nvSpPr>
-        <p:spPr>
-          <a:xfrm>
-            <a:off x="103188" y="750888"/>
-            <a:ext cx="6678612" cy="3757612"/>
-          </a:xfrm>
-        </p:spPr>
+        <p:spPr/>
       </p:sp>
       <p:sp>
         <p:nvSpPr>
@@ -1828,10 +1833,7 @@
           <a:bodyPr/>
           <a:lstStyle/>
           <a:p>
-            <a:r>
-              <a:rPr lang="en-US" dirty="0"/>
-              <a:t>http://erlang.org/doc/apps/eunit/chapter.html</a:t>
-            </a:r>
+            <a:endParaRPr lang="en-US" dirty="0"/>
           </a:p>
         </p:txBody>
       </p:sp>
@@ -1877,6 +1879,484 @@
               <a:rPr lang="en-US" smtClean="0"/>
               <a:pPr/>
               <a:t>23</a:t>
+            </a:fld>
+            <a:endParaRPr lang="en-US" dirty="0"/>
+          </a:p>
+        </p:txBody>
+      </p:sp>
+      <p:sp>
+        <p:nvSpPr>
+          <p:cNvPr id="6" name="Header Placeholder 5"/>
+          <p:cNvSpPr>
+            <a:spLocks noGrp="1"/>
+          </p:cNvSpPr>
+          <p:nvPr>
+            <p:ph type="hdr" sz="quarter" idx="12"/>
+          </p:nvPr>
+        </p:nvSpPr>
+        <p:spPr/>
+        <p:txBody>
+          <a:bodyPr/>
+          <a:lstStyle/>
+          <a:p>
+            <a:r>
+              <a:rPr lang="en-US"/>
+              <a:t>Basic Erlang - Part 2 </a:t>
+            </a:r>
+            <a:endParaRPr lang="en-US" dirty="0"/>
+          </a:p>
+        </p:txBody>
+      </p:sp>
+      <p:sp>
+        <p:nvSpPr>
+          <p:cNvPr id="7" name="Footer Placeholder 6"/>
+          <p:cNvSpPr>
+            <a:spLocks noGrp="1"/>
+          </p:cNvSpPr>
+          <p:nvPr>
+            <p:ph type="ftr" sz="quarter" idx="13"/>
+          </p:nvPr>
+        </p:nvSpPr>
+        <p:spPr/>
+        <p:txBody>
+          <a:bodyPr/>
+          <a:lstStyle/>
+          <a:p>
+            <a:r>
+              <a:rPr lang="en-US"/>
+              <a:t> </a:t>
+            </a:r>
+            <a:endParaRPr lang="en-US" dirty="0"/>
+          </a:p>
+        </p:txBody>
+      </p:sp>
+    </p:spTree>
+    <p:extLst>
+      <p:ext uri="{BB962C8B-B14F-4D97-AF65-F5344CB8AC3E}">
+        <p14:creationId xmlns:p14="http://schemas.microsoft.com/office/powerpoint/2010/main" val="2059806007"/>
+      </p:ext>
+    </p:extLst>
+  </p:cSld>
+  <p:clrMapOvr>
+    <a:masterClrMapping/>
+  </p:clrMapOvr>
+</p:notes>
+</file>
+
+<file path=ppt/notesSlides/notesSlide7.xml><?xml version="1.0" encoding="utf-8"?>
+<p:notes xmlns:a="http://schemas.openxmlformats.org/drawingml/2006/main" xmlns:r="http://schemas.openxmlformats.org/officeDocument/2006/relationships" xmlns:p="http://schemas.openxmlformats.org/presentationml/2006/main">
+  <p:cSld>
+    <p:spTree>
+      <p:nvGrpSpPr>
+        <p:cNvPr id="1" name=""/>
+        <p:cNvGrpSpPr/>
+        <p:nvPr/>
+      </p:nvGrpSpPr>
+      <p:grpSpPr>
+        <a:xfrm>
+          <a:off x="0" y="0"/>
+          <a:ext cx="0" cy="0"/>
+          <a:chOff x="0" y="0"/>
+          <a:chExt cx="0" cy="0"/>
+        </a:xfrm>
+      </p:grpSpPr>
+      <p:sp>
+        <p:nvSpPr>
+          <p:cNvPr id="2" name="Slide Image Placeholder 1"/>
+          <p:cNvSpPr>
+            <a:spLocks noGrp="1" noRot="1" noChangeAspect="1"/>
+          </p:cNvSpPr>
+          <p:nvPr>
+            <p:ph type="sldImg"/>
+          </p:nvPr>
+        </p:nvSpPr>
+        <p:spPr/>
+      </p:sp>
+      <p:sp>
+        <p:nvSpPr>
+          <p:cNvPr id="3" name="Notes Placeholder 2"/>
+          <p:cNvSpPr>
+            <a:spLocks noGrp="1"/>
+          </p:cNvSpPr>
+          <p:nvPr>
+            <p:ph type="body" idx="1"/>
+          </p:nvPr>
+        </p:nvSpPr>
+        <p:spPr/>
+        <p:txBody>
+          <a:bodyPr/>
+          <a:lstStyle/>
+          <a:p>
+            <a:endParaRPr lang="en-US" dirty="0"/>
+          </a:p>
+        </p:txBody>
+      </p:sp>
+      <p:sp>
+        <p:nvSpPr>
+          <p:cNvPr id="4" name="Date Placeholder 3"/>
+          <p:cNvSpPr>
+            <a:spLocks noGrp="1"/>
+          </p:cNvSpPr>
+          <p:nvPr>
+            <p:ph type="dt" idx="10"/>
+          </p:nvPr>
+        </p:nvSpPr>
+        <p:spPr/>
+        <p:txBody>
+          <a:bodyPr/>
+          <a:lstStyle/>
+          <a:p>
+            <a:r>
+              <a:rPr lang="en-US"/>
+              <a:t>2017-03-07 </a:t>
+            </a:r>
+            <a:endParaRPr lang="en-US" dirty="0"/>
+          </a:p>
+        </p:txBody>
+      </p:sp>
+      <p:sp>
+        <p:nvSpPr>
+          <p:cNvPr id="5" name="Slide Number Placeholder 4"/>
+          <p:cNvSpPr>
+            <a:spLocks noGrp="1"/>
+          </p:cNvSpPr>
+          <p:nvPr>
+            <p:ph type="sldNum" sz="quarter" idx="11"/>
+          </p:nvPr>
+        </p:nvSpPr>
+        <p:spPr/>
+        <p:txBody>
+          <a:bodyPr/>
+          <a:lstStyle/>
+          <a:p>
+            <a:fld id="{5852353D-F306-481A-B3D0-C36CE0BF9563}" type="slidenum">
+              <a:rPr lang="en-US" smtClean="0"/>
+              <a:pPr/>
+              <a:t>24</a:t>
+            </a:fld>
+            <a:endParaRPr lang="en-US" dirty="0"/>
+          </a:p>
+        </p:txBody>
+      </p:sp>
+      <p:sp>
+        <p:nvSpPr>
+          <p:cNvPr id="6" name="Header Placeholder 5"/>
+          <p:cNvSpPr>
+            <a:spLocks noGrp="1"/>
+          </p:cNvSpPr>
+          <p:nvPr>
+            <p:ph type="hdr" sz="quarter" idx="12"/>
+          </p:nvPr>
+        </p:nvSpPr>
+        <p:spPr/>
+        <p:txBody>
+          <a:bodyPr/>
+          <a:lstStyle/>
+          <a:p>
+            <a:r>
+              <a:rPr lang="en-US"/>
+              <a:t>Basic Erlang - Part 2 </a:t>
+            </a:r>
+            <a:endParaRPr lang="en-US" dirty="0"/>
+          </a:p>
+        </p:txBody>
+      </p:sp>
+      <p:sp>
+        <p:nvSpPr>
+          <p:cNvPr id="7" name="Footer Placeholder 6"/>
+          <p:cNvSpPr>
+            <a:spLocks noGrp="1"/>
+          </p:cNvSpPr>
+          <p:nvPr>
+            <p:ph type="ftr" sz="quarter" idx="13"/>
+          </p:nvPr>
+        </p:nvSpPr>
+        <p:spPr/>
+        <p:txBody>
+          <a:bodyPr/>
+          <a:lstStyle/>
+          <a:p>
+            <a:r>
+              <a:rPr lang="en-US"/>
+              <a:t> </a:t>
+            </a:r>
+            <a:endParaRPr lang="en-US" dirty="0"/>
+          </a:p>
+        </p:txBody>
+      </p:sp>
+    </p:spTree>
+    <p:extLst>
+      <p:ext uri="{BB962C8B-B14F-4D97-AF65-F5344CB8AC3E}">
+        <p14:creationId xmlns:p14="http://schemas.microsoft.com/office/powerpoint/2010/main" val="139531292"/>
+      </p:ext>
+    </p:extLst>
+  </p:cSld>
+  <p:clrMapOvr>
+    <a:masterClrMapping/>
+  </p:clrMapOvr>
+</p:notes>
+</file>
+
+<file path=ppt/notesSlides/notesSlide8.xml><?xml version="1.0" encoding="utf-8"?>
+<p:notes xmlns:a="http://schemas.openxmlformats.org/drawingml/2006/main" xmlns:r="http://schemas.openxmlformats.org/officeDocument/2006/relationships" xmlns:p="http://schemas.openxmlformats.org/presentationml/2006/main">
+  <p:cSld>
+    <p:spTree>
+      <p:nvGrpSpPr>
+        <p:cNvPr id="1" name=""/>
+        <p:cNvGrpSpPr/>
+        <p:nvPr/>
+      </p:nvGrpSpPr>
+      <p:grpSpPr>
+        <a:xfrm>
+          <a:off x="0" y="0"/>
+          <a:ext cx="0" cy="0"/>
+          <a:chOff x="0" y="0"/>
+          <a:chExt cx="0" cy="0"/>
+        </a:xfrm>
+      </p:grpSpPr>
+      <p:sp>
+        <p:nvSpPr>
+          <p:cNvPr id="2" name="Slide Image Placeholder 1"/>
+          <p:cNvSpPr>
+            <a:spLocks noGrp="1" noRot="1" noChangeAspect="1"/>
+          </p:cNvSpPr>
+          <p:nvPr>
+            <p:ph type="sldImg"/>
+          </p:nvPr>
+        </p:nvSpPr>
+        <p:spPr>
+          <a:xfrm>
+            <a:off x="103188" y="750888"/>
+            <a:ext cx="6678612" cy="3757612"/>
+          </a:xfrm>
+        </p:spPr>
+      </p:sp>
+      <p:sp>
+        <p:nvSpPr>
+          <p:cNvPr id="3" name="Notes Placeholder 2"/>
+          <p:cNvSpPr>
+            <a:spLocks noGrp="1"/>
+          </p:cNvSpPr>
+          <p:nvPr>
+            <p:ph type="body" idx="1"/>
+          </p:nvPr>
+        </p:nvSpPr>
+        <p:spPr/>
+        <p:txBody>
+          <a:bodyPr/>
+          <a:lstStyle/>
+          <a:p>
+            <a:r>
+              <a:rPr lang="en-US" dirty="0"/>
+              <a:t>http://erlang.org/doc/apps/eunit/chapter.html</a:t>
+            </a:r>
+          </a:p>
+        </p:txBody>
+      </p:sp>
+      <p:sp>
+        <p:nvSpPr>
+          <p:cNvPr id="4" name="Date Placeholder 3"/>
+          <p:cNvSpPr>
+            <a:spLocks noGrp="1"/>
+          </p:cNvSpPr>
+          <p:nvPr>
+            <p:ph type="dt" idx="10"/>
+          </p:nvPr>
+        </p:nvSpPr>
+        <p:spPr/>
+        <p:txBody>
+          <a:bodyPr/>
+          <a:lstStyle/>
+          <a:p>
+            <a:r>
+              <a:rPr lang="en-US"/>
+              <a:t>2017-03-07 </a:t>
+            </a:r>
+            <a:endParaRPr lang="en-US" dirty="0"/>
+          </a:p>
+        </p:txBody>
+      </p:sp>
+      <p:sp>
+        <p:nvSpPr>
+          <p:cNvPr id="5" name="Slide Number Placeholder 4"/>
+          <p:cNvSpPr>
+            <a:spLocks noGrp="1"/>
+          </p:cNvSpPr>
+          <p:nvPr>
+            <p:ph type="sldNum" sz="quarter" idx="11"/>
+          </p:nvPr>
+        </p:nvSpPr>
+        <p:spPr/>
+        <p:txBody>
+          <a:bodyPr/>
+          <a:lstStyle/>
+          <a:p>
+            <a:fld id="{5852353D-F306-481A-B3D0-C36CE0BF9563}" type="slidenum">
+              <a:rPr lang="en-US" smtClean="0"/>
+              <a:pPr/>
+              <a:t>25</a:t>
+            </a:fld>
+            <a:endParaRPr lang="en-US" dirty="0"/>
+          </a:p>
+        </p:txBody>
+      </p:sp>
+      <p:sp>
+        <p:nvSpPr>
+          <p:cNvPr id="6" name="Header Placeholder 5"/>
+          <p:cNvSpPr>
+            <a:spLocks noGrp="1"/>
+          </p:cNvSpPr>
+          <p:nvPr>
+            <p:ph type="hdr" sz="quarter" idx="12"/>
+          </p:nvPr>
+        </p:nvSpPr>
+        <p:spPr/>
+        <p:txBody>
+          <a:bodyPr/>
+          <a:lstStyle/>
+          <a:p>
+            <a:r>
+              <a:rPr lang="en-US"/>
+              <a:t>Basic Erlang - Part 2 </a:t>
+            </a:r>
+            <a:endParaRPr lang="en-US" dirty="0"/>
+          </a:p>
+        </p:txBody>
+      </p:sp>
+      <p:sp>
+        <p:nvSpPr>
+          <p:cNvPr id="7" name="Footer Placeholder 6"/>
+          <p:cNvSpPr>
+            <a:spLocks noGrp="1"/>
+          </p:cNvSpPr>
+          <p:nvPr>
+            <p:ph type="ftr" sz="quarter" idx="13"/>
+          </p:nvPr>
+        </p:nvSpPr>
+        <p:spPr/>
+        <p:txBody>
+          <a:bodyPr/>
+          <a:lstStyle/>
+          <a:p>
+            <a:r>
+              <a:rPr lang="en-US"/>
+              <a:t> </a:t>
+            </a:r>
+            <a:endParaRPr lang="en-US" dirty="0"/>
+          </a:p>
+        </p:txBody>
+      </p:sp>
+    </p:spTree>
+    <p:extLst>
+      <p:ext uri="{BB962C8B-B14F-4D97-AF65-F5344CB8AC3E}">
+        <p14:creationId xmlns:p14="http://schemas.microsoft.com/office/powerpoint/2010/main" val="3828296707"/>
+      </p:ext>
+    </p:extLst>
+  </p:cSld>
+  <p:clrMapOvr>
+    <a:masterClrMapping/>
+  </p:clrMapOvr>
+</p:notes>
+</file>
+
+<file path=ppt/notesSlides/notesSlide9.xml><?xml version="1.0" encoding="utf-8"?>
+<p:notes xmlns:a="http://schemas.openxmlformats.org/drawingml/2006/main" xmlns:r="http://schemas.openxmlformats.org/officeDocument/2006/relationships" xmlns:p="http://schemas.openxmlformats.org/presentationml/2006/main">
+  <p:cSld>
+    <p:spTree>
+      <p:nvGrpSpPr>
+        <p:cNvPr id="1" name=""/>
+        <p:cNvGrpSpPr/>
+        <p:nvPr/>
+      </p:nvGrpSpPr>
+      <p:grpSpPr>
+        <a:xfrm>
+          <a:off x="0" y="0"/>
+          <a:ext cx="0" cy="0"/>
+          <a:chOff x="0" y="0"/>
+          <a:chExt cx="0" cy="0"/>
+        </a:xfrm>
+      </p:grpSpPr>
+      <p:sp>
+        <p:nvSpPr>
+          <p:cNvPr id="2" name="Slide Image Placeholder 1"/>
+          <p:cNvSpPr>
+            <a:spLocks noGrp="1" noRot="1" noChangeAspect="1"/>
+          </p:cNvSpPr>
+          <p:nvPr>
+            <p:ph type="sldImg"/>
+          </p:nvPr>
+        </p:nvSpPr>
+        <p:spPr>
+          <a:xfrm>
+            <a:off x="103188" y="750888"/>
+            <a:ext cx="6678612" cy="3757612"/>
+          </a:xfrm>
+        </p:spPr>
+      </p:sp>
+      <p:sp>
+        <p:nvSpPr>
+          <p:cNvPr id="3" name="Notes Placeholder 2"/>
+          <p:cNvSpPr>
+            <a:spLocks noGrp="1"/>
+          </p:cNvSpPr>
+          <p:nvPr>
+            <p:ph type="body" idx="1"/>
+          </p:nvPr>
+        </p:nvSpPr>
+        <p:spPr/>
+        <p:txBody>
+          <a:bodyPr/>
+          <a:lstStyle/>
+          <a:p>
+            <a:r>
+              <a:rPr lang="en-US" dirty="0"/>
+              <a:t>http://erlang.org/doc/apps/eunit/chapter.html</a:t>
+            </a:r>
+          </a:p>
+        </p:txBody>
+      </p:sp>
+      <p:sp>
+        <p:nvSpPr>
+          <p:cNvPr id="4" name="Date Placeholder 3"/>
+          <p:cNvSpPr>
+            <a:spLocks noGrp="1"/>
+          </p:cNvSpPr>
+          <p:nvPr>
+            <p:ph type="dt" idx="10"/>
+          </p:nvPr>
+        </p:nvSpPr>
+        <p:spPr/>
+        <p:txBody>
+          <a:bodyPr/>
+          <a:lstStyle/>
+          <a:p>
+            <a:r>
+              <a:rPr lang="en-US"/>
+              <a:t>2017-03-07 </a:t>
+            </a:r>
+            <a:endParaRPr lang="en-US" dirty="0"/>
+          </a:p>
+        </p:txBody>
+      </p:sp>
+      <p:sp>
+        <p:nvSpPr>
+          <p:cNvPr id="5" name="Slide Number Placeholder 4"/>
+          <p:cNvSpPr>
+            <a:spLocks noGrp="1"/>
+          </p:cNvSpPr>
+          <p:nvPr>
+            <p:ph type="sldNum" sz="quarter" idx="11"/>
+          </p:nvPr>
+        </p:nvSpPr>
+        <p:spPr/>
+        <p:txBody>
+          <a:bodyPr/>
+          <a:lstStyle/>
+          <a:p>
+            <a:fld id="{5852353D-F306-481A-B3D0-C36CE0BF9563}" type="slidenum">
+              <a:rPr lang="en-US" smtClean="0"/>
+              <a:pPr/>
+              <a:t>28</a:t>
             </a:fld>
             <a:endParaRPr lang="en-US" dirty="0"/>
           </a:p>
@@ -7318,6 +7798,21 @@
               <a:t>Macros</a:t>
             </a:r>
           </a:p>
+          <a:p>
+            <a:pPr marL="0" indent="0">
+              <a:buNone/>
+            </a:pPr>
+            <a:r>
+              <a:rPr lang="en-US" sz="4400" dirty="0">
+                <a:solidFill>
+                  <a:schemeClr val="accent6">
+                    <a:lumMod val="75000"/>
+                  </a:schemeClr>
+                </a:solidFill>
+              </a:rPr>
+              <a:t>Control</a:t>
+            </a:r>
+          </a:p>
         </p:txBody>
       </p:sp>
       <p:sp>
@@ -7400,6 +7895,46 @@
           <a:xfrm>
             <a:off x="1716506" y="4310785"/>
             <a:ext cx="8293769" cy="794975"/>
+          </a:xfrm>
+          <a:prstGeom prst="rect">
+            <a:avLst/>
+          </a:prstGeom>
+          <a:solidFill>
+            <a:schemeClr val="bg1">
+              <a:alpha val="70000"/>
+            </a:schemeClr>
+          </a:solidFill>
+          <a:ln w="12700" cap="flat" cmpd="sng" algn="ctr">
+            <a:noFill/>
+            <a:prstDash val="solid"/>
+            <a:round/>
+            <a:headEnd type="none" w="med" len="med"/>
+            <a:tailEnd type="none" w="med" len="med"/>
+          </a:ln>
+          <a:effectLst/>
+        </p:spPr>
+        <p:txBody>
+          <a:bodyPr vert="horz" wrap="none" lIns="72000" tIns="45720" rIns="72000" bIns="45720" numCol="1" rtlCol="0" anchor="t" anchorCtr="0" compatLnSpc="1">
+            <a:prstTxWarp prst="textNoShape">
+              <a:avLst/>
+            </a:prstTxWarp>
+          </a:bodyPr>
+          <a:lstStyle/>
+          <a:p>
+            <a:endParaRPr lang="en-US"/>
+          </a:p>
+        </p:txBody>
+      </p:sp>
+      <p:sp>
+        <p:nvSpPr>
+          <p:cNvPr id="7" name="Rectangle 6"/>
+          <p:cNvSpPr/>
+          <p:nvPr/>
+        </p:nvSpPr>
+        <p:spPr bwMode="auto">
+          <a:xfrm>
+            <a:off x="1975772" y="5825876"/>
+            <a:ext cx="8293769" cy="646164"/>
           </a:xfrm>
           <a:prstGeom prst="rect">
             <a:avLst/>
@@ -7745,6 +8280,9 @@
             </a:r>
           </a:p>
           <a:p>
+            <a:endParaRPr lang="en-US" dirty="0"/>
+          </a:p>
+          <a:p>
             <a:r>
               <a:rPr lang="en-US" dirty="0">
                 <a:latin typeface="Consolas" panose="020B0609020204030204" pitchFamily="49" charset="0"/>
@@ -7983,6 +8521,21 @@
               <a:t>Macros</a:t>
             </a:r>
           </a:p>
+          <a:p>
+            <a:pPr marL="0" indent="0">
+              <a:buNone/>
+            </a:pPr>
+            <a:r>
+              <a:rPr lang="en-US" sz="4400" dirty="0">
+                <a:solidFill>
+                  <a:schemeClr val="accent6">
+                    <a:lumMod val="75000"/>
+                  </a:schemeClr>
+                </a:solidFill>
+              </a:rPr>
+              <a:t>Control</a:t>
+            </a:r>
+          </a:p>
         </p:txBody>
       </p:sp>
       <p:sp>
@@ -8024,7 +8577,7 @@
         <p:spPr bwMode="auto">
           <a:xfrm>
             <a:off x="1868906" y="4219074"/>
-            <a:ext cx="8293769" cy="1914187"/>
+            <a:ext cx="8293769" cy="2198659"/>
           </a:xfrm>
           <a:prstGeom prst="rect">
             <a:avLst/>
@@ -8114,7 +8667,7 @@
                 </a:solidFill>
                 <a:latin typeface="+mn-lt"/>
               </a:rPr>
-              <a:t>Macros</a:t>
+              <a:t>Test objects</a:t>
             </a:r>
             <a:endParaRPr lang="en-US" dirty="0">
               <a:latin typeface="+mn-lt"/>
@@ -8143,82 +8696,29 @@
           <a:lstStyle/>
           <a:p>
             <a:r>
-              <a:rPr lang="en-US" dirty="0"/>
+              <a:rPr lang="en-US" sz="3600" dirty="0"/>
               <a:t>Remember the fixtures from before and how the tests in the list could either be just a fun or a tuple with a description and a fun?</a:t>
             </a:r>
           </a:p>
           <a:p>
-            <a:r>
-              <a:rPr lang="en-US" dirty="0"/>
-              <a:t>These are only two of many different representation a test in a fixture can have – these different representations are called "test objects".</a:t>
-            </a:r>
-          </a:p>
-          <a:p>
-            <a:r>
-              <a:rPr lang="en-US" dirty="0"/>
-              <a:t>Another example of a test object is</a:t>
-            </a:r>
-            <a:br>
-              <a:rPr lang="en-US" dirty="0"/>
-            </a:br>
-            <a:r>
-              <a:rPr lang="en-US" dirty="0">
-                <a:latin typeface="Consolas" panose="020B0609020204030204" pitchFamily="49" charset="0"/>
-                <a:cs typeface="Consolas" panose="020B0609020204030204" pitchFamily="49" charset="0"/>
-              </a:rPr>
-              <a:t>{</a:t>
-            </a:r>
-            <a:r>
-              <a:rPr lang="en-US" dirty="0" err="1">
-                <a:latin typeface="Consolas" panose="020B0609020204030204" pitchFamily="49" charset="0"/>
-                <a:cs typeface="Consolas" panose="020B0609020204030204" pitchFamily="49" charset="0"/>
-              </a:rPr>
-              <a:t>LineNumber</a:t>
-            </a:r>
-            <a:r>
-              <a:rPr lang="en-US" dirty="0">
-                <a:latin typeface="Consolas" panose="020B0609020204030204" pitchFamily="49" charset="0"/>
-                <a:cs typeface="Consolas" panose="020B0609020204030204" pitchFamily="49" charset="0"/>
-              </a:rPr>
-              <a:t>, </a:t>
-            </a:r>
-            <a:r>
-              <a:rPr lang="en-US" dirty="0" err="1">
-                <a:latin typeface="Consolas" panose="020B0609020204030204" pitchFamily="49" charset="0"/>
-                <a:cs typeface="Consolas" panose="020B0609020204030204" pitchFamily="49" charset="0"/>
-              </a:rPr>
-              <a:t>TestObject</a:t>
-            </a:r>
-            <a:r>
-              <a:rPr lang="en-US" dirty="0">
-                <a:latin typeface="Consolas" panose="020B0609020204030204" pitchFamily="49" charset="0"/>
-                <a:cs typeface="Consolas" panose="020B0609020204030204" pitchFamily="49" charset="0"/>
-              </a:rPr>
-              <a:t>} </a:t>
-            </a:r>
-            <a:r>
-              <a:rPr lang="en-US" dirty="0"/>
-              <a:t>where </a:t>
-            </a:r>
-            <a:r>
-              <a:rPr lang="en-US" dirty="0" err="1"/>
-              <a:t>LineNumber</a:t>
-            </a:r>
-            <a:r>
-              <a:rPr lang="en-US" dirty="0"/>
-              <a:t> is an integer and </a:t>
-            </a:r>
-            <a:r>
-              <a:rPr lang="en-US" dirty="0" err="1"/>
-              <a:t>TestObject</a:t>
-            </a:r>
-            <a:r>
-              <a:rPr lang="en-US" dirty="0"/>
-              <a:t> is another test object, for example a fun or a {Description, fun}.</a:t>
-            </a:r>
-          </a:p>
-          <a:p>
-            <a:endParaRPr lang="en-US" dirty="0"/>
+            <a:endParaRPr lang="en-US" sz="3600" dirty="0"/>
+          </a:p>
+          <a:p>
+            <a:r>
+              <a:rPr lang="en-US" sz="3600" dirty="0"/>
+              <a:t>These are only some of many different representation a test can have – these different representations are called </a:t>
+            </a:r>
+            <a:r>
+              <a:rPr lang="en-US" sz="3600" i="1" dirty="0"/>
+              <a:t>test objects</a:t>
+            </a:r>
+            <a:r>
+              <a:rPr lang="en-US" sz="3600" dirty="0"/>
+              <a:t>.</a:t>
+            </a:r>
+          </a:p>
+          <a:p>
+            <a:endParaRPr lang="en-US" sz="3600" dirty="0"/>
           </a:p>
         </p:txBody>
       </p:sp>
@@ -8254,7 +8754,124 @@
       </p:grpSpPr>
       <p:sp>
         <p:nvSpPr>
-          <p:cNvPr id="8" name="Title 2"/>
+          <p:cNvPr id="2" name="Content Placeholder 1"/>
+          <p:cNvSpPr>
+            <a:spLocks noGrp="1"/>
+          </p:cNvSpPr>
+          <p:nvPr>
+            <p:ph idx="1"/>
+          </p:nvPr>
+        </p:nvSpPr>
+        <p:spPr/>
+        <p:txBody>
+          <a:bodyPr/>
+          <a:lstStyle/>
+          <a:p>
+            <a:r>
+              <a:rPr lang="en-US" sz="3600" dirty="0"/>
+              <a:t>Another example of a test object is</a:t>
+            </a:r>
+            <a:br>
+              <a:rPr lang="en-US" sz="3600" dirty="0"/>
+            </a:br>
+            <a:r>
+              <a:rPr lang="en-US" sz="3600" dirty="0">
+                <a:latin typeface="Consolas" panose="020B0609020204030204" pitchFamily="49" charset="0"/>
+                <a:cs typeface="Consolas" panose="020B0609020204030204" pitchFamily="49" charset="0"/>
+              </a:rPr>
+              <a:t>{</a:t>
+            </a:r>
+            <a:r>
+              <a:rPr lang="en-US" sz="3600" dirty="0" err="1">
+                <a:latin typeface="Consolas" panose="020B0609020204030204" pitchFamily="49" charset="0"/>
+                <a:cs typeface="Consolas" panose="020B0609020204030204" pitchFamily="49" charset="0"/>
+              </a:rPr>
+              <a:t>LineNumber</a:t>
+            </a:r>
+            <a:r>
+              <a:rPr lang="en-US" sz="3600" dirty="0">
+                <a:latin typeface="Consolas" panose="020B0609020204030204" pitchFamily="49" charset="0"/>
+                <a:cs typeface="Consolas" panose="020B0609020204030204" pitchFamily="49" charset="0"/>
+              </a:rPr>
+              <a:t>, </a:t>
+            </a:r>
+            <a:r>
+              <a:rPr lang="en-US" sz="3600" dirty="0" err="1">
+                <a:latin typeface="Consolas" panose="020B0609020204030204" pitchFamily="49" charset="0"/>
+                <a:cs typeface="Consolas" panose="020B0609020204030204" pitchFamily="49" charset="0"/>
+              </a:rPr>
+              <a:t>TestObject</a:t>
+            </a:r>
+            <a:r>
+              <a:rPr lang="en-US" sz="3600" dirty="0">
+                <a:latin typeface="Consolas" panose="020B0609020204030204" pitchFamily="49" charset="0"/>
+                <a:cs typeface="Consolas" panose="020B0609020204030204" pitchFamily="49" charset="0"/>
+              </a:rPr>
+              <a:t>}</a:t>
+            </a:r>
+            <a:br>
+              <a:rPr lang="en-US" sz="3600" dirty="0">
+                <a:latin typeface="Consolas" panose="020B0609020204030204" pitchFamily="49" charset="0"/>
+                <a:cs typeface="Consolas" panose="020B0609020204030204" pitchFamily="49" charset="0"/>
+              </a:rPr>
+            </a:br>
+            <a:r>
+              <a:rPr lang="en-US" sz="3600" dirty="0"/>
+              <a:t>where </a:t>
+            </a:r>
+            <a:r>
+              <a:rPr lang="en-US" sz="3600" dirty="0" err="1"/>
+              <a:t>LineNumber</a:t>
+            </a:r>
+            <a:r>
+              <a:rPr lang="en-US" sz="3600" dirty="0"/>
+              <a:t> is an integer and </a:t>
+            </a:r>
+            <a:r>
+              <a:rPr lang="en-US" sz="3600" dirty="0" err="1"/>
+              <a:t>TestObject</a:t>
+            </a:r>
+            <a:r>
+              <a:rPr lang="en-US" sz="3600" dirty="0"/>
+              <a:t> is another test object, for example a fun() or a </a:t>
+            </a:r>
+            <a:r>
+              <a:rPr lang="en-US" sz="3600" dirty="0">
+                <a:latin typeface="Consolas" panose="020B0609020204030204" pitchFamily="49" charset="0"/>
+                <a:cs typeface="Consolas" panose="020B0609020204030204" pitchFamily="49" charset="0"/>
+              </a:rPr>
+              <a:t>{Description, fun()}</a:t>
+            </a:r>
+            <a:r>
+              <a:rPr lang="en-US" sz="3600" dirty="0"/>
+              <a:t>.</a:t>
+            </a:r>
+          </a:p>
+          <a:p>
+            <a:r>
+              <a:rPr lang="en-US" sz="3600" dirty="0"/>
+              <a:t>In other words, a simple </a:t>
+            </a:r>
+            <a:r>
+              <a:rPr lang="en-US" sz="3600" dirty="0" err="1"/>
+              <a:t>nullary</a:t>
+            </a:r>
+            <a:r>
+              <a:rPr lang="en-US" sz="3600" dirty="0"/>
+              <a:t> fun() – a fun() with 0 arguments – is also a test object.</a:t>
+            </a:r>
+          </a:p>
+          <a:p>
+            <a:pPr marL="0" indent="0">
+              <a:buNone/>
+            </a:pPr>
+            <a:endParaRPr lang="en-US" dirty="0"/>
+          </a:p>
+        </p:txBody>
+      </p:sp>
+      <p:sp>
+        <p:nvSpPr>
+          <p:cNvPr id="3" name="Title 2"/>
           <p:cNvSpPr>
             <a:spLocks noGrp="1"/>
           </p:cNvSpPr>
@@ -8262,12 +8879,7 @@
             <p:ph type="title"/>
           </p:nvPr>
         </p:nvSpPr>
-        <p:spPr>
-          <a:xfrm>
-            <a:off x="524935" y="239714"/>
-            <a:ext cx="9992784" cy="1085371"/>
-          </a:xfrm>
-        </p:spPr>
+        <p:spPr/>
         <p:txBody>
           <a:bodyPr/>
           <a:lstStyle/>
@@ -8281,7 +8893,7 @@
                 </a:solidFill>
                 <a:latin typeface="+mn-lt"/>
               </a:rPr>
-              <a:t>Macros</a:t>
+              <a:t>Test objects</a:t>
             </a:r>
             <a:endParaRPr lang="en-US" dirty="0">
               <a:latin typeface="+mn-lt"/>
@@ -8289,106 +8901,10 @@
           </a:p>
         </p:txBody>
       </p:sp>
-      <p:sp>
-        <p:nvSpPr>
-          <p:cNvPr id="9" name="Content Placeholder 1"/>
-          <p:cNvSpPr>
-            <a:spLocks noGrp="1"/>
-          </p:cNvSpPr>
-          <p:nvPr>
-            <p:ph idx="1"/>
-          </p:nvPr>
-        </p:nvSpPr>
-        <p:spPr>
-          <a:xfrm>
-            <a:off x="529168" y="1800000"/>
-            <a:ext cx="11135785" cy="3852000"/>
-          </a:xfrm>
-        </p:spPr>
-        <p:txBody>
-          <a:bodyPr/>
-          <a:lstStyle/>
-          <a:p>
-            <a:r>
-              <a:rPr lang="en-US" dirty="0"/>
-              <a:t>All assert macros from before also have versions starting with _ (underscore).</a:t>
-            </a:r>
-            <a:br>
-              <a:rPr lang="en-US" dirty="0"/>
-            </a:br>
-            <a:r>
-              <a:rPr lang="en-US" dirty="0"/>
-              <a:t>For example: </a:t>
-            </a:r>
-            <a:r>
-              <a:rPr lang="en-US" dirty="0">
-                <a:latin typeface="Consolas" panose="020B0609020204030204" pitchFamily="49" charset="0"/>
-                <a:cs typeface="Consolas" panose="020B0609020204030204" pitchFamily="49" charset="0"/>
-              </a:rPr>
-              <a:t>?_</a:t>
-            </a:r>
-            <a:r>
-              <a:rPr lang="en-US" dirty="0" err="1">
-                <a:latin typeface="Consolas" panose="020B0609020204030204" pitchFamily="49" charset="0"/>
-                <a:cs typeface="Consolas" panose="020B0609020204030204" pitchFamily="49" charset="0"/>
-              </a:rPr>
-              <a:t>assertEqual</a:t>
-            </a:r>
-            <a:r>
-              <a:rPr lang="en-US" dirty="0">
-                <a:latin typeface="Consolas" panose="020B0609020204030204" pitchFamily="49" charset="0"/>
-                <a:cs typeface="Consolas" panose="020B0609020204030204" pitchFamily="49" charset="0"/>
-              </a:rPr>
-              <a:t>(5, 3+2).</a:t>
-            </a:r>
-          </a:p>
-          <a:p>
-            <a:r>
-              <a:rPr lang="en-US" dirty="0"/>
-              <a:t>The difference: instead of executing the test, as ?</a:t>
-            </a:r>
-            <a:r>
-              <a:rPr lang="en-US" dirty="0" err="1"/>
-              <a:t>assertEqual</a:t>
-            </a:r>
-            <a:r>
-              <a:rPr lang="en-US" dirty="0"/>
-              <a:t> would do, the underscore macros generate a test object – incidentally, they generate </a:t>
-            </a:r>
-            <a:r>
-              <a:rPr lang="en-US" dirty="0">
-                <a:latin typeface="Consolas" panose="020B0609020204030204" pitchFamily="49" charset="0"/>
-                <a:cs typeface="Consolas" panose="020B0609020204030204" pitchFamily="49" charset="0"/>
-              </a:rPr>
-              <a:t>{</a:t>
-            </a:r>
-            <a:r>
-              <a:rPr lang="en-US" dirty="0" err="1">
-                <a:latin typeface="Consolas" panose="020B0609020204030204" pitchFamily="49" charset="0"/>
-                <a:cs typeface="Consolas" panose="020B0609020204030204" pitchFamily="49" charset="0"/>
-              </a:rPr>
-              <a:t>LineNumber</a:t>
-            </a:r>
-            <a:r>
-              <a:rPr lang="en-US" dirty="0">
-                <a:latin typeface="Consolas" panose="020B0609020204030204" pitchFamily="49" charset="0"/>
-                <a:cs typeface="Consolas" panose="020B0609020204030204" pitchFamily="49" charset="0"/>
-              </a:rPr>
-              <a:t>, fun()}</a:t>
-            </a:r>
-          </a:p>
-          <a:p>
-            <a:r>
-              <a:rPr lang="en-US" dirty="0"/>
-              <a:t>This is a nice shorthand for creating fixtures of short tests.</a:t>
-            </a:r>
-          </a:p>
-        </p:txBody>
-      </p:sp>
     </p:spTree>
     <p:extLst>
       <p:ext uri="{BB962C8B-B14F-4D97-AF65-F5344CB8AC3E}">
-        <p14:creationId xmlns:p14="http://schemas.microsoft.com/office/powerpoint/2010/main" val="3585499033"/>
+        <p14:creationId xmlns:p14="http://schemas.microsoft.com/office/powerpoint/2010/main" val="1654031167"/>
       </p:ext>
     </p:extLst>
   </p:cSld>
@@ -8417,6 +8933,173 @@
       </p:grpSpPr>
       <p:sp>
         <p:nvSpPr>
+          <p:cNvPr id="8" name="Title 2"/>
+          <p:cNvSpPr>
+            <a:spLocks noGrp="1"/>
+          </p:cNvSpPr>
+          <p:nvPr>
+            <p:ph type="title"/>
+          </p:nvPr>
+        </p:nvSpPr>
+        <p:spPr>
+          <a:xfrm>
+            <a:off x="524935" y="239714"/>
+            <a:ext cx="9992784" cy="1085371"/>
+          </a:xfrm>
+        </p:spPr>
+        <p:txBody>
+          <a:bodyPr/>
+          <a:lstStyle/>
+          <a:p>
+            <a:r>
+              <a:rPr lang="en-US" dirty="0">
+                <a:solidFill>
+                  <a:schemeClr val="accent1">
+                    <a:lumMod val="75000"/>
+                  </a:schemeClr>
+                </a:solidFill>
+                <a:latin typeface="+mn-lt"/>
+              </a:rPr>
+              <a:t>Macros</a:t>
+            </a:r>
+            <a:endParaRPr lang="en-US" dirty="0">
+              <a:latin typeface="+mn-lt"/>
+            </a:endParaRPr>
+          </a:p>
+        </p:txBody>
+      </p:sp>
+      <p:sp>
+        <p:nvSpPr>
+          <p:cNvPr id="9" name="Content Placeholder 1"/>
+          <p:cNvSpPr>
+            <a:spLocks noGrp="1"/>
+          </p:cNvSpPr>
+          <p:nvPr>
+            <p:ph idx="1"/>
+          </p:nvPr>
+        </p:nvSpPr>
+        <p:spPr>
+          <a:xfrm>
+            <a:off x="529168" y="1800000"/>
+            <a:ext cx="11135785" cy="3852000"/>
+          </a:xfrm>
+        </p:spPr>
+        <p:txBody>
+          <a:bodyPr/>
+          <a:lstStyle/>
+          <a:p>
+            <a:r>
+              <a:rPr lang="en-US" sz="2800" dirty="0"/>
+              <a:t>All assert macros from before also have versions starting with _ (underscore).</a:t>
+            </a:r>
+            <a:br>
+              <a:rPr lang="en-US" sz="2800" dirty="0"/>
+            </a:br>
+            <a:r>
+              <a:rPr lang="en-US" sz="2800" dirty="0"/>
+              <a:t>For example: </a:t>
+            </a:r>
+            <a:r>
+              <a:rPr lang="en-US" sz="2800" dirty="0">
+                <a:latin typeface="Consolas" panose="020B0609020204030204" pitchFamily="49" charset="0"/>
+                <a:cs typeface="Consolas" panose="020B0609020204030204" pitchFamily="49" charset="0"/>
+              </a:rPr>
+              <a:t>?_</a:t>
+            </a:r>
+            <a:r>
+              <a:rPr lang="en-US" sz="2800" dirty="0" err="1">
+                <a:latin typeface="Consolas" panose="020B0609020204030204" pitchFamily="49" charset="0"/>
+                <a:cs typeface="Consolas" panose="020B0609020204030204" pitchFamily="49" charset="0"/>
+              </a:rPr>
+              <a:t>assertEqual</a:t>
+            </a:r>
+            <a:r>
+              <a:rPr lang="en-US" sz="2800" dirty="0">
+                <a:latin typeface="Consolas" panose="020B0609020204030204" pitchFamily="49" charset="0"/>
+                <a:cs typeface="Consolas" panose="020B0609020204030204" pitchFamily="49" charset="0"/>
+              </a:rPr>
+              <a:t>(5, 3+2).</a:t>
+            </a:r>
+          </a:p>
+          <a:p>
+            <a:endParaRPr lang="en-US" sz="2800" dirty="0">
+              <a:latin typeface="Consolas" panose="020B0609020204030204" pitchFamily="49" charset="0"/>
+              <a:cs typeface="Consolas" panose="020B0609020204030204" pitchFamily="49" charset="0"/>
+            </a:endParaRPr>
+          </a:p>
+          <a:p>
+            <a:r>
+              <a:rPr lang="en-US" sz="2800" dirty="0"/>
+              <a:t>The difference: underscore macros generate test objects – incidentally, they generate </a:t>
+            </a:r>
+            <a:r>
+              <a:rPr lang="en-US" sz="2800" dirty="0">
+                <a:latin typeface="Consolas" panose="020B0609020204030204" pitchFamily="49" charset="0"/>
+                <a:cs typeface="Consolas" panose="020B0609020204030204" pitchFamily="49" charset="0"/>
+              </a:rPr>
+              <a:t>{</a:t>
+            </a:r>
+            <a:r>
+              <a:rPr lang="en-US" sz="2800" dirty="0" err="1">
+                <a:latin typeface="Consolas" panose="020B0609020204030204" pitchFamily="49" charset="0"/>
+                <a:cs typeface="Consolas" panose="020B0609020204030204" pitchFamily="49" charset="0"/>
+              </a:rPr>
+              <a:t>LineNumber</a:t>
+            </a:r>
+            <a:r>
+              <a:rPr lang="en-US" sz="2800" dirty="0">
+                <a:latin typeface="Consolas" panose="020B0609020204030204" pitchFamily="49" charset="0"/>
+                <a:cs typeface="Consolas" panose="020B0609020204030204" pitchFamily="49" charset="0"/>
+              </a:rPr>
+              <a:t>, fun()}</a:t>
+            </a:r>
+          </a:p>
+          <a:p>
+            <a:endParaRPr lang="en-US" sz="2800" dirty="0">
+              <a:latin typeface="Consolas" panose="020B0609020204030204" pitchFamily="49" charset="0"/>
+              <a:cs typeface="Consolas" panose="020B0609020204030204" pitchFamily="49" charset="0"/>
+            </a:endParaRPr>
+          </a:p>
+          <a:p>
+            <a:r>
+              <a:rPr lang="en-US" sz="2800" dirty="0"/>
+              <a:t>This is a nice shorthand for creating fixtures of multiple short tests.</a:t>
+            </a:r>
+          </a:p>
+        </p:txBody>
+      </p:sp>
+    </p:spTree>
+    <p:extLst>
+      <p:ext uri="{BB962C8B-B14F-4D97-AF65-F5344CB8AC3E}">
+        <p14:creationId xmlns:p14="http://schemas.microsoft.com/office/powerpoint/2010/main" val="3585499033"/>
+      </p:ext>
+    </p:extLst>
+  </p:cSld>
+  <p:clrMapOvr>
+    <a:masterClrMapping/>
+  </p:clrMapOvr>
+</p:sld>
+</file>
+
+<file path=ppt/slides/slide23.xml><?xml version="1.0" encoding="utf-8"?>
+<p:sld xmlns:a="http://schemas.openxmlformats.org/drawingml/2006/main" xmlns:r="http://schemas.openxmlformats.org/officeDocument/2006/relationships" xmlns:p="http://schemas.openxmlformats.org/presentationml/2006/main">
+  <p:cSld>
+    <p:spTree>
+      <p:nvGrpSpPr>
+        <p:cNvPr id="1" name=""/>
+        <p:cNvGrpSpPr/>
+        <p:nvPr/>
+      </p:nvGrpSpPr>
+      <p:grpSpPr>
+        <a:xfrm>
+          <a:off x="0" y="0"/>
+          <a:ext cx="0" cy="0"/>
+          <a:chOff x="0" y="0"/>
+          <a:chExt cx="0" cy="0"/>
+        </a:xfrm>
+      </p:grpSpPr>
+      <p:sp>
+        <p:nvSpPr>
           <p:cNvPr id="7" name="Rectangle: Rounded Corners 6"/>
           <p:cNvSpPr/>
           <p:nvPr/>
@@ -8611,7 +9294,871 @@
 </p:sld>
 </file>
 
-<file path=ppt/slides/slide23.xml><?xml version="1.0" encoding="utf-8"?>
+<file path=ppt/slides/slide24.xml><?xml version="1.0" encoding="utf-8"?>
+<p:sld xmlns:a="http://schemas.openxmlformats.org/drawingml/2006/main" xmlns:r="http://schemas.openxmlformats.org/officeDocument/2006/relationships" xmlns:p="http://schemas.openxmlformats.org/presentationml/2006/main">
+  <p:cSld>
+    <p:spTree>
+      <p:nvGrpSpPr>
+        <p:cNvPr id="1" name=""/>
+        <p:cNvGrpSpPr/>
+        <p:nvPr/>
+      </p:nvGrpSpPr>
+      <p:grpSpPr>
+        <a:xfrm>
+          <a:off x="0" y="0"/>
+          <a:ext cx="0" cy="0"/>
+          <a:chOff x="0" y="0"/>
+          <a:chExt cx="0" cy="0"/>
+        </a:xfrm>
+      </p:grpSpPr>
+      <p:sp>
+        <p:nvSpPr>
+          <p:cNvPr id="9" name="Rectangle: Rounded Corners 8"/>
+          <p:cNvSpPr/>
+          <p:nvPr/>
+        </p:nvSpPr>
+        <p:spPr bwMode="auto">
+          <a:xfrm>
+            <a:off x="3037419" y="3236118"/>
+            <a:ext cx="4967815" cy="2180694"/>
+          </a:xfrm>
+          <a:prstGeom prst="roundRect">
+            <a:avLst/>
+          </a:prstGeom>
+          <a:solidFill>
+            <a:srgbClr val="000000"/>
+          </a:solidFill>
+          <a:ln w="12700" cap="flat" cmpd="sng" algn="ctr">
+            <a:noFill/>
+            <a:prstDash val="solid"/>
+            <a:round/>
+            <a:headEnd type="none" w="med" len="med"/>
+            <a:tailEnd type="none" w="med" len="med"/>
+          </a:ln>
+          <a:effectLst/>
+        </p:spPr>
+        <p:txBody>
+          <a:bodyPr vert="horz" wrap="none" lIns="72000" tIns="45720" rIns="72000" bIns="45720" numCol="1" rtlCol="0" anchor="t" anchorCtr="0" compatLnSpc="1">
+            <a:prstTxWarp prst="textNoShape">
+              <a:avLst/>
+            </a:prstTxWarp>
+          </a:bodyPr>
+          <a:lstStyle/>
+          <a:p>
+            <a:endParaRPr lang="en-US"/>
+          </a:p>
+        </p:txBody>
+      </p:sp>
+      <p:sp>
+        <p:nvSpPr>
+          <p:cNvPr id="2" name="Content Placeholder 1"/>
+          <p:cNvSpPr>
+            <a:spLocks noGrp="1"/>
+          </p:cNvSpPr>
+          <p:nvPr>
+            <p:ph idx="1"/>
+          </p:nvPr>
+        </p:nvSpPr>
+        <p:spPr/>
+        <p:txBody>
+          <a:bodyPr/>
+          <a:lstStyle/>
+          <a:p>
+            <a:r>
+              <a:rPr lang="en-US" dirty="0" err="1"/>
+              <a:t>eunit</a:t>
+            </a:r>
+            <a:r>
+              <a:rPr lang="en-US" dirty="0"/>
+              <a:t> will automagically convert all of your </a:t>
+            </a:r>
+            <a:r>
+              <a:rPr lang="en-US" dirty="0" err="1">
+                <a:latin typeface="Consolas" panose="020B0609020204030204" pitchFamily="49" charset="0"/>
+                <a:cs typeface="Consolas" panose="020B0609020204030204" pitchFamily="49" charset="0"/>
+              </a:rPr>
+              <a:t>some_test</a:t>
+            </a:r>
+            <a:r>
+              <a:rPr lang="en-US" dirty="0">
+                <a:latin typeface="Consolas" panose="020B0609020204030204" pitchFamily="49" charset="0"/>
+                <a:cs typeface="Consolas" panose="020B0609020204030204" pitchFamily="49" charset="0"/>
+              </a:rPr>
+              <a:t>()</a:t>
+            </a:r>
+            <a:r>
+              <a:rPr lang="en-US" dirty="0"/>
+              <a:t> cases to test descriptors, </a:t>
+            </a:r>
+            <a:r>
+              <a:rPr lang="en-US" dirty="0">
+                <a:latin typeface="Consolas" panose="020B0609020204030204" pitchFamily="49" charset="0"/>
+                <a:cs typeface="Consolas" panose="020B0609020204030204" pitchFamily="49" charset="0"/>
+              </a:rPr>
+              <a:t>fun() -&gt; </a:t>
+            </a:r>
+            <a:r>
+              <a:rPr lang="en-US" dirty="0" err="1">
+                <a:latin typeface="Consolas" panose="020B0609020204030204" pitchFamily="49" charset="0"/>
+                <a:cs typeface="Consolas" panose="020B0609020204030204" pitchFamily="49" charset="0"/>
+              </a:rPr>
+              <a:t>some_test</a:t>
+            </a:r>
+            <a:r>
+              <a:rPr lang="en-US" dirty="0">
+                <a:latin typeface="Consolas" panose="020B0609020204030204" pitchFamily="49" charset="0"/>
+                <a:cs typeface="Consolas" panose="020B0609020204030204" pitchFamily="49" charset="0"/>
+              </a:rPr>
+              <a:t>() end</a:t>
+            </a:r>
+            <a:r>
+              <a:rPr lang="en-US" dirty="0"/>
+              <a:t> and run them like that.</a:t>
+            </a:r>
+          </a:p>
+        </p:txBody>
+      </p:sp>
+      <p:sp>
+        <p:nvSpPr>
+          <p:cNvPr id="8" name="Title 2"/>
+          <p:cNvSpPr>
+            <a:spLocks noGrp="1"/>
+          </p:cNvSpPr>
+          <p:nvPr>
+            <p:ph type="title"/>
+          </p:nvPr>
+        </p:nvSpPr>
+        <p:spPr>
+          <a:xfrm>
+            <a:off x="524935" y="239714"/>
+            <a:ext cx="9992784" cy="1085371"/>
+          </a:xfrm>
+        </p:spPr>
+        <p:txBody>
+          <a:bodyPr/>
+          <a:lstStyle/>
+          <a:p>
+            <a:r>
+              <a:rPr lang="en-US" dirty="0">
+                <a:solidFill>
+                  <a:schemeClr val="accent1">
+                    <a:lumMod val="75000"/>
+                  </a:schemeClr>
+                </a:solidFill>
+                <a:latin typeface="+mn-lt"/>
+              </a:rPr>
+              <a:t>By the way…</a:t>
+            </a:r>
+            <a:endParaRPr lang="en-US" dirty="0">
+              <a:latin typeface="+mn-lt"/>
+            </a:endParaRPr>
+          </a:p>
+        </p:txBody>
+      </p:sp>
+      <p:pic>
+        <p:nvPicPr>
+          <p:cNvPr id="3" name="Picture 2"/>
+          <p:cNvPicPr>
+            <a:picLocks noChangeAspect="1"/>
+          </p:cNvPicPr>
+          <p:nvPr/>
+        </p:nvPicPr>
+        <p:blipFill>
+          <a:blip r:embed="rId3"/>
+          <a:stretch>
+            <a:fillRect/>
+          </a:stretch>
+        </p:blipFill>
+        <p:spPr>
+          <a:xfrm>
+            <a:off x="3559177" y="3559703"/>
+            <a:ext cx="3924300" cy="1533525"/>
+          </a:xfrm>
+          <a:prstGeom prst="rect">
+            <a:avLst/>
+          </a:prstGeom>
+        </p:spPr>
+      </p:pic>
+    </p:spTree>
+    <p:extLst>
+      <p:ext uri="{BB962C8B-B14F-4D97-AF65-F5344CB8AC3E}">
+        <p14:creationId xmlns:p14="http://schemas.microsoft.com/office/powerpoint/2010/main" val="3428248145"/>
+      </p:ext>
+    </p:extLst>
+  </p:cSld>
+  <p:clrMapOvr>
+    <a:masterClrMapping/>
+  </p:clrMapOvr>
+</p:sld>
+</file>
+
+<file path=ppt/slides/slide25.xml><?xml version="1.0" encoding="utf-8"?>
+<p:sld xmlns:a="http://schemas.openxmlformats.org/drawingml/2006/main" xmlns:r="http://schemas.openxmlformats.org/officeDocument/2006/relationships" xmlns:p="http://schemas.openxmlformats.org/presentationml/2006/main">
+  <p:cSld>
+    <p:spTree>
+      <p:nvGrpSpPr>
+        <p:cNvPr id="1" name=""/>
+        <p:cNvGrpSpPr/>
+        <p:nvPr/>
+      </p:nvGrpSpPr>
+      <p:grpSpPr>
+        <a:xfrm>
+          <a:off x="0" y="0"/>
+          <a:ext cx="0" cy="0"/>
+          <a:chOff x="0" y="0"/>
+          <a:chExt cx="0" cy="0"/>
+        </a:xfrm>
+      </p:grpSpPr>
+      <p:sp>
+        <p:nvSpPr>
+          <p:cNvPr id="2" name="Content Placeholder 1"/>
+          <p:cNvSpPr>
+            <a:spLocks noGrp="1"/>
+          </p:cNvSpPr>
+          <p:nvPr>
+            <p:ph idx="1"/>
+          </p:nvPr>
+        </p:nvSpPr>
+        <p:spPr>
+          <a:xfrm>
+            <a:off x="1917702" y="3416968"/>
+            <a:ext cx="8351839" cy="2700253"/>
+          </a:xfrm>
+        </p:spPr>
+        <p:txBody>
+          <a:bodyPr/>
+          <a:lstStyle/>
+          <a:p>
+            <a:pPr marL="0" indent="0">
+              <a:buNone/>
+            </a:pPr>
+            <a:r>
+              <a:rPr lang="en-US" sz="4400" dirty="0">
+                <a:solidFill>
+                  <a:schemeClr val="tx2">
+                    <a:lumMod val="50000"/>
+                    <a:lumOff val="50000"/>
+                  </a:schemeClr>
+                </a:solidFill>
+              </a:rPr>
+              <a:t>Test modules and test functions</a:t>
+            </a:r>
+          </a:p>
+          <a:p>
+            <a:pPr marL="0" indent="0">
+              <a:buNone/>
+            </a:pPr>
+            <a:r>
+              <a:rPr lang="en-US" sz="4400" dirty="0">
+                <a:solidFill>
+                  <a:srgbClr val="C00000"/>
+                </a:solidFill>
+              </a:rPr>
+              <a:t>Fixtures</a:t>
+            </a:r>
+          </a:p>
+          <a:p>
+            <a:pPr marL="0" indent="0">
+              <a:buNone/>
+            </a:pPr>
+            <a:r>
+              <a:rPr lang="en-US" sz="4400" dirty="0">
+                <a:solidFill>
+                  <a:schemeClr val="accent1">
+                    <a:lumMod val="75000"/>
+                  </a:schemeClr>
+                </a:solidFill>
+              </a:rPr>
+              <a:t>Macros</a:t>
+            </a:r>
+          </a:p>
+          <a:p>
+            <a:pPr marL="0" indent="0">
+              <a:buNone/>
+            </a:pPr>
+            <a:r>
+              <a:rPr lang="en-US" sz="4400" dirty="0">
+                <a:solidFill>
+                  <a:schemeClr val="accent6">
+                    <a:lumMod val="75000"/>
+                  </a:schemeClr>
+                </a:solidFill>
+              </a:rPr>
+              <a:t>Control</a:t>
+            </a:r>
+          </a:p>
+        </p:txBody>
+      </p:sp>
+      <p:sp>
+        <p:nvSpPr>
+          <p:cNvPr id="3" name="Title 2"/>
+          <p:cNvSpPr>
+            <a:spLocks noGrp="1"/>
+          </p:cNvSpPr>
+          <p:nvPr>
+            <p:ph type="title"/>
+          </p:nvPr>
+        </p:nvSpPr>
+        <p:spPr>
+          <a:xfrm>
+            <a:off x="1917701" y="239714"/>
+            <a:ext cx="7494588" cy="3161213"/>
+          </a:xfrm>
+        </p:spPr>
+        <p:txBody>
+          <a:bodyPr>
+            <a:normAutofit/>
+          </a:bodyPr>
+          <a:lstStyle/>
+          <a:p>
+            <a:r>
+              <a:rPr lang="en-US" sz="16600" dirty="0" err="1"/>
+              <a:t>Eunit</a:t>
+            </a:r>
+            <a:endParaRPr lang="en-US" sz="16600" dirty="0"/>
+          </a:p>
+        </p:txBody>
+      </p:sp>
+      <p:sp>
+        <p:nvSpPr>
+          <p:cNvPr id="5" name="Rectangle 4"/>
+          <p:cNvSpPr/>
+          <p:nvPr/>
+        </p:nvSpPr>
+        <p:spPr bwMode="auto">
+          <a:xfrm>
+            <a:off x="1716506" y="3310826"/>
+            <a:ext cx="8293769" cy="794975"/>
+          </a:xfrm>
+          <a:prstGeom prst="rect">
+            <a:avLst/>
+          </a:prstGeom>
+          <a:solidFill>
+            <a:schemeClr val="bg1">
+              <a:alpha val="70000"/>
+            </a:schemeClr>
+          </a:solidFill>
+          <a:ln w="12700" cap="flat" cmpd="sng" algn="ctr">
+            <a:noFill/>
+            <a:prstDash val="solid"/>
+            <a:round/>
+            <a:headEnd type="none" w="med" len="med"/>
+            <a:tailEnd type="none" w="med" len="med"/>
+          </a:ln>
+          <a:effectLst/>
+        </p:spPr>
+        <p:txBody>
+          <a:bodyPr vert="horz" wrap="none" lIns="72000" tIns="45720" rIns="72000" bIns="45720" numCol="1" rtlCol="0" anchor="t" anchorCtr="0" compatLnSpc="1">
+            <a:prstTxWarp prst="textNoShape">
+              <a:avLst/>
+            </a:prstTxWarp>
+          </a:bodyPr>
+          <a:lstStyle/>
+          <a:p>
+            <a:endParaRPr lang="en-US"/>
+          </a:p>
+        </p:txBody>
+      </p:sp>
+      <p:sp>
+        <p:nvSpPr>
+          <p:cNvPr id="6" name="Rectangle 5"/>
+          <p:cNvSpPr/>
+          <p:nvPr/>
+        </p:nvSpPr>
+        <p:spPr bwMode="auto">
+          <a:xfrm>
+            <a:off x="1716506" y="4310785"/>
+            <a:ext cx="8293769" cy="794975"/>
+          </a:xfrm>
+          <a:prstGeom prst="rect">
+            <a:avLst/>
+          </a:prstGeom>
+          <a:solidFill>
+            <a:schemeClr val="bg1">
+              <a:alpha val="70000"/>
+            </a:schemeClr>
+          </a:solidFill>
+          <a:ln w="12700" cap="flat" cmpd="sng" algn="ctr">
+            <a:noFill/>
+            <a:prstDash val="solid"/>
+            <a:round/>
+            <a:headEnd type="none" w="med" len="med"/>
+            <a:tailEnd type="none" w="med" len="med"/>
+          </a:ln>
+          <a:effectLst/>
+        </p:spPr>
+        <p:txBody>
+          <a:bodyPr vert="horz" wrap="none" lIns="72000" tIns="45720" rIns="72000" bIns="45720" numCol="1" rtlCol="0" anchor="t" anchorCtr="0" compatLnSpc="1">
+            <a:prstTxWarp prst="textNoShape">
+              <a:avLst/>
+            </a:prstTxWarp>
+          </a:bodyPr>
+          <a:lstStyle/>
+          <a:p>
+            <a:endParaRPr lang="en-US"/>
+          </a:p>
+        </p:txBody>
+      </p:sp>
+      <p:sp>
+        <p:nvSpPr>
+          <p:cNvPr id="7" name="Rectangle 6"/>
+          <p:cNvSpPr/>
+          <p:nvPr/>
+        </p:nvSpPr>
+        <p:spPr bwMode="auto">
+          <a:xfrm>
+            <a:off x="1975772" y="5105760"/>
+            <a:ext cx="8293769" cy="646164"/>
+          </a:xfrm>
+          <a:prstGeom prst="rect">
+            <a:avLst/>
+          </a:prstGeom>
+          <a:solidFill>
+            <a:schemeClr val="bg1">
+              <a:alpha val="70000"/>
+            </a:schemeClr>
+          </a:solidFill>
+          <a:ln w="12700" cap="flat" cmpd="sng" algn="ctr">
+            <a:noFill/>
+            <a:prstDash val="solid"/>
+            <a:round/>
+            <a:headEnd type="none" w="med" len="med"/>
+            <a:tailEnd type="none" w="med" len="med"/>
+          </a:ln>
+          <a:effectLst/>
+        </p:spPr>
+        <p:txBody>
+          <a:bodyPr vert="horz" wrap="none" lIns="72000" tIns="45720" rIns="72000" bIns="45720" numCol="1" rtlCol="0" anchor="t" anchorCtr="0" compatLnSpc="1">
+            <a:prstTxWarp prst="textNoShape">
+              <a:avLst/>
+            </a:prstTxWarp>
+          </a:bodyPr>
+          <a:lstStyle/>
+          <a:p>
+            <a:endParaRPr lang="en-US"/>
+          </a:p>
+        </p:txBody>
+      </p:sp>
+    </p:spTree>
+    <p:extLst>
+      <p:ext uri="{BB962C8B-B14F-4D97-AF65-F5344CB8AC3E}">
+        <p14:creationId xmlns:p14="http://schemas.microsoft.com/office/powerpoint/2010/main" val="484043581"/>
+      </p:ext>
+    </p:extLst>
+  </p:cSld>
+  <p:clrMapOvr>
+    <a:masterClrMapping/>
+  </p:clrMapOvr>
+</p:sld>
+</file>
+
+<file path=ppt/slides/slide26.xml><?xml version="1.0" encoding="utf-8"?>
+<p:sld xmlns:a="http://schemas.openxmlformats.org/drawingml/2006/main" xmlns:r="http://schemas.openxmlformats.org/officeDocument/2006/relationships" xmlns:p="http://schemas.openxmlformats.org/presentationml/2006/main">
+  <p:cSld>
+    <p:spTree>
+      <p:nvGrpSpPr>
+        <p:cNvPr id="1" name=""/>
+        <p:cNvGrpSpPr/>
+        <p:nvPr/>
+      </p:nvGrpSpPr>
+      <p:grpSpPr>
+        <a:xfrm>
+          <a:off x="0" y="0"/>
+          <a:ext cx="0" cy="0"/>
+          <a:chOff x="0" y="0"/>
+          <a:chExt cx="0" cy="0"/>
+        </a:xfrm>
+      </p:grpSpPr>
+      <p:sp>
+        <p:nvSpPr>
+          <p:cNvPr id="8" name="Title 2"/>
+          <p:cNvSpPr>
+            <a:spLocks noGrp="1"/>
+          </p:cNvSpPr>
+          <p:nvPr>
+            <p:ph type="title"/>
+          </p:nvPr>
+        </p:nvSpPr>
+        <p:spPr>
+          <a:xfrm>
+            <a:off x="524935" y="239714"/>
+            <a:ext cx="9992784" cy="1085371"/>
+          </a:xfrm>
+        </p:spPr>
+        <p:txBody>
+          <a:bodyPr/>
+          <a:lstStyle/>
+          <a:p>
+            <a:r>
+              <a:rPr lang="en-US" dirty="0">
+                <a:solidFill>
+                  <a:schemeClr val="accent6">
+                    <a:lumMod val="75000"/>
+                  </a:schemeClr>
+                </a:solidFill>
+                <a:latin typeface="+mn-lt"/>
+              </a:rPr>
+              <a:t>Control</a:t>
+            </a:r>
+          </a:p>
+        </p:txBody>
+      </p:sp>
+      <p:sp>
+        <p:nvSpPr>
+          <p:cNvPr id="9" name="Content Placeholder 1"/>
+          <p:cNvSpPr>
+            <a:spLocks noGrp="1"/>
+          </p:cNvSpPr>
+          <p:nvPr>
+            <p:ph idx="1"/>
+          </p:nvPr>
+        </p:nvSpPr>
+        <p:spPr>
+          <a:xfrm>
+            <a:off x="529168" y="1800000"/>
+            <a:ext cx="11135785" cy="3852000"/>
+          </a:xfrm>
+        </p:spPr>
+        <p:txBody>
+          <a:bodyPr/>
+          <a:lstStyle/>
+          <a:p>
+            <a:r>
+              <a:rPr lang="en-US" dirty="0"/>
+              <a:t>There are also some </a:t>
+            </a:r>
+            <a:r>
+              <a:rPr lang="en-US" i="1" dirty="0"/>
+              <a:t>control </a:t>
+            </a:r>
+            <a:r>
+              <a:rPr lang="en-US" dirty="0"/>
+              <a:t>options available.</a:t>
+            </a:r>
+          </a:p>
+          <a:p>
+            <a:r>
+              <a:rPr lang="en-US" dirty="0">
+                <a:latin typeface="Consolas" panose="020B0609020204030204" pitchFamily="49" charset="0"/>
+                <a:cs typeface="Consolas" panose="020B0609020204030204" pitchFamily="49" charset="0"/>
+              </a:rPr>
+              <a:t>{spawn, Tests}</a:t>
+            </a:r>
+            <a:r>
+              <a:rPr lang="en-US" dirty="0"/>
+              <a:t> runs the test in a new </a:t>
+            </a:r>
+            <a:r>
+              <a:rPr lang="en-US" dirty="0" err="1"/>
+              <a:t>subprocess</a:t>
+            </a:r>
+            <a:r>
+              <a:rPr lang="en-US" dirty="0"/>
+              <a:t>.</a:t>
+            </a:r>
+          </a:p>
+          <a:p>
+            <a:r>
+              <a:rPr lang="en-US" dirty="0">
+                <a:latin typeface="Consolas" panose="020B0609020204030204" pitchFamily="49" charset="0"/>
+                <a:cs typeface="Consolas" panose="020B0609020204030204" pitchFamily="49" charset="0"/>
+              </a:rPr>
+              <a:t>{spawn, Node, Tests}</a:t>
+            </a:r>
+            <a:r>
+              <a:rPr lang="en-US" dirty="0"/>
+              <a:t> additionally runs the tests on the specified node.</a:t>
+            </a:r>
+          </a:p>
+          <a:p>
+            <a:r>
+              <a:rPr lang="en-US" dirty="0">
+                <a:latin typeface="Consolas" panose="020B0609020204030204" pitchFamily="49" charset="0"/>
+                <a:cs typeface="Consolas" panose="020B0609020204030204" pitchFamily="49" charset="0"/>
+              </a:rPr>
+              <a:t>{timeout, Seconds, Tests}</a:t>
+            </a:r>
+            <a:r>
+              <a:rPr lang="en-US" dirty="0"/>
+              <a:t> sets a timeout value for the tests.</a:t>
+            </a:r>
+          </a:p>
+          <a:p>
+            <a:r>
+              <a:rPr lang="en-US" dirty="0">
+                <a:latin typeface="Consolas" panose="020B0609020204030204" pitchFamily="49" charset="0"/>
+                <a:cs typeface="Consolas" panose="020B0609020204030204" pitchFamily="49" charset="0"/>
+              </a:rPr>
+              <a:t>{</a:t>
+            </a:r>
+            <a:r>
+              <a:rPr lang="en-US" dirty="0" err="1">
+                <a:latin typeface="Consolas" panose="020B0609020204030204" pitchFamily="49" charset="0"/>
+                <a:cs typeface="Consolas" panose="020B0609020204030204" pitchFamily="49" charset="0"/>
+              </a:rPr>
+              <a:t>inorder</a:t>
+            </a:r>
+            <a:r>
+              <a:rPr lang="en-US" dirty="0">
+                <a:latin typeface="Consolas" panose="020B0609020204030204" pitchFamily="49" charset="0"/>
+                <a:cs typeface="Consolas" panose="020B0609020204030204" pitchFamily="49" charset="0"/>
+              </a:rPr>
+              <a:t>, Tests}</a:t>
+            </a:r>
+            <a:r>
+              <a:rPr lang="en-US" dirty="0"/>
+              <a:t> runs the tests in the specified order.</a:t>
+            </a:r>
+          </a:p>
+          <a:p>
+            <a:r>
+              <a:rPr lang="en-US" dirty="0">
+                <a:latin typeface="Consolas" panose="020B0609020204030204" pitchFamily="49" charset="0"/>
+                <a:cs typeface="Consolas" panose="020B0609020204030204" pitchFamily="49" charset="0"/>
+              </a:rPr>
+              <a:t>{</a:t>
+            </a:r>
+            <a:r>
+              <a:rPr lang="en-US" dirty="0" err="1">
+                <a:latin typeface="Consolas" panose="020B0609020204030204" pitchFamily="49" charset="0"/>
+                <a:cs typeface="Consolas" panose="020B0609020204030204" pitchFamily="49" charset="0"/>
+              </a:rPr>
+              <a:t>inparallel</a:t>
+            </a:r>
+            <a:r>
+              <a:rPr lang="en-US" dirty="0">
+                <a:latin typeface="Consolas" panose="020B0609020204030204" pitchFamily="49" charset="0"/>
+                <a:cs typeface="Consolas" panose="020B0609020204030204" pitchFamily="49" charset="0"/>
+              </a:rPr>
+              <a:t>, Tests}</a:t>
+            </a:r>
+            <a:r>
+              <a:rPr lang="en-US" dirty="0"/>
+              <a:t> runs the tests in parallel, if possible.</a:t>
+            </a:r>
+          </a:p>
+          <a:p>
+            <a:r>
+              <a:rPr lang="en-US" dirty="0">
+                <a:latin typeface="Consolas" panose="020B0609020204030204" pitchFamily="49" charset="0"/>
+                <a:cs typeface="Consolas" panose="020B0609020204030204" pitchFamily="49" charset="0"/>
+              </a:rPr>
+              <a:t>{</a:t>
+            </a:r>
+            <a:r>
+              <a:rPr lang="en-US" dirty="0" err="1">
+                <a:latin typeface="Consolas" panose="020B0609020204030204" pitchFamily="49" charset="0"/>
+                <a:cs typeface="Consolas" panose="020B0609020204030204" pitchFamily="49" charset="0"/>
+              </a:rPr>
+              <a:t>inparallel</a:t>
+            </a:r>
+            <a:r>
+              <a:rPr lang="en-US" dirty="0">
+                <a:latin typeface="Consolas" panose="020B0609020204030204" pitchFamily="49" charset="0"/>
+                <a:cs typeface="Consolas" panose="020B0609020204030204" pitchFamily="49" charset="0"/>
+              </a:rPr>
+              <a:t>, Max, Tests}</a:t>
+            </a:r>
+            <a:r>
+              <a:rPr lang="en-US" dirty="0"/>
+              <a:t> runs at most </a:t>
+            </a:r>
+            <a:r>
+              <a:rPr lang="en-US" dirty="0">
+                <a:latin typeface="Consolas" panose="020B0609020204030204" pitchFamily="49" charset="0"/>
+                <a:cs typeface="Consolas" panose="020B0609020204030204" pitchFamily="49" charset="0"/>
+              </a:rPr>
+              <a:t>Max</a:t>
+            </a:r>
+            <a:r>
+              <a:rPr lang="en-US" dirty="0"/>
+              <a:t> tests in parallel.</a:t>
+            </a:r>
+          </a:p>
+          <a:p>
+            <a:endParaRPr lang="en-US" dirty="0"/>
+          </a:p>
+        </p:txBody>
+      </p:sp>
+    </p:spTree>
+    <p:extLst>
+      <p:ext uri="{BB962C8B-B14F-4D97-AF65-F5344CB8AC3E}">
+        <p14:creationId xmlns:p14="http://schemas.microsoft.com/office/powerpoint/2010/main" val="797656659"/>
+      </p:ext>
+    </p:extLst>
+  </p:cSld>
+  <p:clrMapOvr>
+    <a:masterClrMapping/>
+  </p:clrMapOvr>
+</p:sld>
+</file>
+
+<file path=ppt/slides/slide27.xml><?xml version="1.0" encoding="utf-8"?>
+<p:sld xmlns:a="http://schemas.openxmlformats.org/drawingml/2006/main" xmlns:r="http://schemas.openxmlformats.org/officeDocument/2006/relationships" xmlns:p="http://schemas.openxmlformats.org/presentationml/2006/main">
+  <p:cSld>
+    <p:spTree>
+      <p:nvGrpSpPr>
+        <p:cNvPr id="1" name=""/>
+        <p:cNvGrpSpPr/>
+        <p:nvPr/>
+      </p:nvGrpSpPr>
+      <p:grpSpPr>
+        <a:xfrm>
+          <a:off x="0" y="0"/>
+          <a:ext cx="0" cy="0"/>
+          <a:chOff x="0" y="0"/>
+          <a:chExt cx="0" cy="0"/>
+        </a:xfrm>
+      </p:grpSpPr>
+      <p:sp>
+        <p:nvSpPr>
+          <p:cNvPr id="5" name="Rectangle: Rounded Corners 4"/>
+          <p:cNvSpPr/>
+          <p:nvPr/>
+        </p:nvSpPr>
+        <p:spPr bwMode="auto">
+          <a:xfrm>
+            <a:off x="1608667" y="2607732"/>
+            <a:ext cx="9330266" cy="3647371"/>
+          </a:xfrm>
+          <a:prstGeom prst="roundRect">
+            <a:avLst/>
+          </a:prstGeom>
+          <a:solidFill>
+            <a:srgbClr val="000000"/>
+          </a:solidFill>
+          <a:ln w="12700" cap="flat" cmpd="sng" algn="ctr">
+            <a:noFill/>
+            <a:prstDash val="solid"/>
+            <a:round/>
+            <a:headEnd type="none" w="med" len="med"/>
+            <a:tailEnd type="none" w="med" len="med"/>
+          </a:ln>
+          <a:effectLst/>
+        </p:spPr>
+        <p:txBody>
+          <a:bodyPr vert="horz" wrap="none" lIns="72000" tIns="45720" rIns="72000" bIns="45720" numCol="1" rtlCol="0" anchor="t" anchorCtr="0" compatLnSpc="1">
+            <a:prstTxWarp prst="textNoShape">
+              <a:avLst/>
+            </a:prstTxWarp>
+          </a:bodyPr>
+          <a:lstStyle/>
+          <a:p>
+            <a:endParaRPr lang="en-US"/>
+          </a:p>
+        </p:txBody>
+      </p:sp>
+      <p:sp>
+        <p:nvSpPr>
+          <p:cNvPr id="8" name="Title 2"/>
+          <p:cNvSpPr>
+            <a:spLocks noGrp="1"/>
+          </p:cNvSpPr>
+          <p:nvPr>
+            <p:ph type="title"/>
+          </p:nvPr>
+        </p:nvSpPr>
+        <p:spPr>
+          <a:xfrm>
+            <a:off x="524935" y="239714"/>
+            <a:ext cx="9992784" cy="1085371"/>
+          </a:xfrm>
+        </p:spPr>
+        <p:txBody>
+          <a:bodyPr/>
+          <a:lstStyle/>
+          <a:p>
+            <a:r>
+              <a:rPr lang="en-US" dirty="0">
+                <a:solidFill>
+                  <a:schemeClr val="accent6">
+                    <a:lumMod val="75000"/>
+                  </a:schemeClr>
+                </a:solidFill>
+                <a:latin typeface="+mn-lt"/>
+              </a:rPr>
+              <a:t>Control</a:t>
+            </a:r>
+          </a:p>
+        </p:txBody>
+      </p:sp>
+      <p:sp>
+        <p:nvSpPr>
+          <p:cNvPr id="9" name="Content Placeholder 1"/>
+          <p:cNvSpPr>
+            <a:spLocks noGrp="1"/>
+          </p:cNvSpPr>
+          <p:nvPr>
+            <p:ph idx="1"/>
+          </p:nvPr>
+        </p:nvSpPr>
+        <p:spPr>
+          <a:xfrm>
+            <a:off x="529168" y="1139600"/>
+            <a:ext cx="11135785" cy="3852000"/>
+          </a:xfrm>
+        </p:spPr>
+        <p:txBody>
+          <a:bodyPr/>
+          <a:lstStyle/>
+          <a:p>
+            <a:r>
+              <a:rPr lang="en-US" dirty="0"/>
+              <a:t>Remember that a test representation contains another test representation, which in turn can contain another test representation.</a:t>
+            </a:r>
+          </a:p>
+          <a:p>
+            <a:r>
+              <a:rPr lang="en-US" dirty="0"/>
+              <a:t>This test is completely legal:</a:t>
+            </a:r>
+          </a:p>
+          <a:p>
+            <a:endParaRPr lang="en-US" dirty="0">
+              <a:latin typeface="Consolas" panose="020B0609020204030204" pitchFamily="49" charset="0"/>
+              <a:cs typeface="Consolas" panose="020B0609020204030204" pitchFamily="49" charset="0"/>
+            </a:endParaRPr>
+          </a:p>
+        </p:txBody>
+      </p:sp>
+      <p:pic>
+        <p:nvPicPr>
+          <p:cNvPr id="2" name="Picture 1"/>
+          <p:cNvPicPr>
+            <a:picLocks noChangeAspect="1"/>
+          </p:cNvPicPr>
+          <p:nvPr/>
+        </p:nvPicPr>
+        <p:blipFill>
+          <a:blip r:embed="rId2"/>
+          <a:stretch>
+            <a:fillRect/>
+          </a:stretch>
+        </p:blipFill>
+        <p:spPr>
+          <a:xfrm>
+            <a:off x="2023533" y="2928151"/>
+            <a:ext cx="8686800" cy="3048000"/>
+          </a:xfrm>
+          <a:prstGeom prst="rect">
+            <a:avLst/>
+          </a:prstGeom>
+        </p:spPr>
+      </p:pic>
+    </p:spTree>
+    <p:extLst>
+      <p:ext uri="{BB962C8B-B14F-4D97-AF65-F5344CB8AC3E}">
+        <p14:creationId xmlns:p14="http://schemas.microsoft.com/office/powerpoint/2010/main" val="1940740018"/>
+      </p:ext>
+    </p:extLst>
+  </p:cSld>
+  <p:clrMapOvr>
+    <a:masterClrMapping/>
+  </p:clrMapOvr>
+</p:sld>
+</file>
+
+<file path=ppt/slides/slide28.xml><?xml version="1.0" encoding="utf-8"?>
 <p:sld xmlns:a="http://schemas.openxmlformats.org/drawingml/2006/main" xmlns:r="http://schemas.openxmlformats.org/officeDocument/2006/relationships" xmlns:p="http://schemas.openxmlformats.org/presentationml/2006/main">
   <p:cSld>
     <p:spTree>
@@ -9378,6 +10925,21 @@
               <a:t>Macros</a:t>
             </a:r>
           </a:p>
+          <a:p>
+            <a:pPr marL="0" indent="0">
+              <a:buNone/>
+            </a:pPr>
+            <a:r>
+              <a:rPr lang="en-US" sz="4400" dirty="0">
+                <a:solidFill>
+                  <a:schemeClr val="accent6">
+                    <a:lumMod val="75000"/>
+                  </a:schemeClr>
+                </a:solidFill>
+              </a:rPr>
+              <a:t>Control</a:t>
+            </a:r>
+          </a:p>
         </p:txBody>
       </p:sp>
       <p:sp>
@@ -9459,7 +11021,7 @@
         <p:spPr bwMode="auto">
           <a:xfrm>
             <a:off x="1716506" y="5105760"/>
-            <a:ext cx="8293769" cy="794975"/>
+            <a:ext cx="8293769" cy="1366279"/>
           </a:xfrm>
           <a:prstGeom prst="rect">
             <a:avLst/>

</xml_diff>

<commit_message>
Updates presentation with some meck stuff
</commit_message>
<xml_diff>
--- a/basic_erlang_4/presentation/erlang_part_4_testing.pptx
+++ b/basic_erlang_4/presentation/erlang_part_4_testing.pptx
@@ -5,10 +5,10 @@
     <p:sldMasterId id="2147483676" r:id="rId1"/>
   </p:sldMasterIdLst>
   <p:notesMasterIdLst>
-    <p:notesMasterId r:id="rId30"/>
+    <p:notesMasterId r:id="rId36"/>
   </p:notesMasterIdLst>
   <p:handoutMasterIdLst>
-    <p:handoutMasterId r:id="rId31"/>
+    <p:handoutMasterId r:id="rId37"/>
   </p:handoutMasterIdLst>
   <p:sldIdLst>
     <p:sldId id="259" r:id="rId2"/>
@@ -39,20 +39,26 @@
     <p:sldId id="283" r:id="rId27"/>
     <p:sldId id="285" r:id="rId28"/>
     <p:sldId id="282" r:id="rId29"/>
+    <p:sldId id="288" r:id="rId30"/>
+    <p:sldId id="289" r:id="rId31"/>
+    <p:sldId id="290" r:id="rId32"/>
+    <p:sldId id="291" r:id="rId33"/>
+    <p:sldId id="292" r:id="rId34"/>
+    <p:sldId id="293" r:id="rId35"/>
   </p:sldIdLst>
   <p:sldSz cx="12192000" cy="6858000"/>
   <p:notesSz cx="6884988" cy="10018713"/>
   <p:embeddedFontLst>
     <p:embeddedFont>
       <p:font typeface="Consolas" panose="020B0609020204030204" pitchFamily="49" charset="0"/>
-      <p:regular r:id="rId32"/>
-      <p:bold r:id="rId33"/>
-      <p:italic r:id="rId34"/>
-      <p:boldItalic r:id="rId35"/>
+      <p:regular r:id="rId38"/>
+      <p:bold r:id="rId39"/>
+      <p:italic r:id="rId40"/>
+      <p:boldItalic r:id="rId41"/>
     </p:embeddedFont>
     <p:embeddedFont>
       <p:font typeface="Ericsson Capital TT" panose="02000503000000020004" pitchFamily="2" charset="0"/>
-      <p:regular r:id="rId36"/>
+      <p:regular r:id="rId42"/>
     </p:embeddedFont>
   </p:embeddedFontLst>
   <p:defaultTextStyle>
@@ -213,6 +219,12 @@
             <p14:sldId id="283"/>
             <p14:sldId id="285"/>
             <p14:sldId id="282"/>
+            <p14:sldId id="288"/>
+            <p14:sldId id="289"/>
+            <p14:sldId id="290"/>
+            <p14:sldId id="291"/>
+            <p14:sldId id="292"/>
+            <p14:sldId id="293"/>
           </p14:sldIdLst>
         </p14:section>
       </p14:sectionLst>
@@ -10239,10 +10251,154 @@
           </a:p>
         </p:txBody>
       </p:sp>
+      <p:sp>
+        <p:nvSpPr>
+          <p:cNvPr id="4" name="TextBox 3"/>
+          <p:cNvSpPr txBox="1"/>
+          <p:nvPr/>
+        </p:nvSpPr>
+        <p:spPr>
+          <a:xfrm>
+            <a:off x="0" y="3966016"/>
+            <a:ext cx="12005734" cy="523220"/>
+          </a:xfrm>
+          <a:prstGeom prst="rect">
+            <a:avLst/>
+          </a:prstGeom>
+          <a:noFill/>
+        </p:spPr>
+        <p:txBody>
+          <a:bodyPr wrap="square" rtlCol="0">
+            <a:spAutoFit/>
+          </a:bodyPr>
+          <a:lstStyle/>
+          <a:p>
+            <a:pPr algn="ctr"/>
+            <a:r>
+              <a:rPr lang="en-US" sz="2800" dirty="0">
+                <a:latin typeface="Consolas" panose="020B0609020204030204" pitchFamily="49" charset="0"/>
+                <a:cs typeface="Consolas" panose="020B0609020204030204" pitchFamily="49" charset="0"/>
+              </a:rPr>
+              <a:t>https://github.com/eproxus/meck</a:t>
+            </a:r>
+          </a:p>
+        </p:txBody>
+      </p:sp>
     </p:spTree>
     <p:extLst>
       <p:ext uri="{BB962C8B-B14F-4D97-AF65-F5344CB8AC3E}">
         <p14:creationId xmlns:p14="http://schemas.microsoft.com/office/powerpoint/2010/main" val="1175298411"/>
+      </p:ext>
+    </p:extLst>
+  </p:cSld>
+  <p:clrMapOvr>
+    <a:masterClrMapping/>
+  </p:clrMapOvr>
+</p:sld>
+</file>
+
+<file path=ppt/slides/slide29.xml><?xml version="1.0" encoding="utf-8"?>
+<p:sld xmlns:a="http://schemas.openxmlformats.org/drawingml/2006/main" xmlns:r="http://schemas.openxmlformats.org/officeDocument/2006/relationships" xmlns:p="http://schemas.openxmlformats.org/presentationml/2006/main">
+  <p:cSld>
+    <p:spTree>
+      <p:nvGrpSpPr>
+        <p:cNvPr id="1" name=""/>
+        <p:cNvGrpSpPr/>
+        <p:nvPr/>
+      </p:nvGrpSpPr>
+      <p:grpSpPr>
+        <a:xfrm>
+          <a:off x="0" y="0"/>
+          <a:ext cx="0" cy="0"/>
+          <a:chOff x="0" y="0"/>
+          <a:chExt cx="0" cy="0"/>
+        </a:xfrm>
+      </p:grpSpPr>
+      <p:sp>
+        <p:nvSpPr>
+          <p:cNvPr id="2" name="Content Placeholder 1"/>
+          <p:cNvSpPr>
+            <a:spLocks noGrp="1"/>
+          </p:cNvSpPr>
+          <p:nvPr>
+            <p:ph idx="1"/>
+          </p:nvPr>
+        </p:nvSpPr>
+        <p:spPr/>
+        <p:txBody>
+          <a:bodyPr/>
+          <a:lstStyle/>
+          <a:p>
+            <a:r>
+              <a:rPr lang="en-US" dirty="0" err="1"/>
+              <a:t>meck</a:t>
+            </a:r>
+            <a:r>
+              <a:rPr lang="en-US" dirty="0"/>
+              <a:t> is not part of OTP. No-one knows why.</a:t>
+            </a:r>
+          </a:p>
+          <a:p>
+            <a:r>
+              <a:rPr lang="en-US" dirty="0"/>
+              <a:t>We must add it to dependencies to be able to use it.</a:t>
+            </a:r>
+          </a:p>
+        </p:txBody>
+      </p:sp>
+      <p:sp>
+        <p:nvSpPr>
+          <p:cNvPr id="3" name="Title 2"/>
+          <p:cNvSpPr>
+            <a:spLocks noGrp="1"/>
+          </p:cNvSpPr>
+          <p:nvPr>
+            <p:ph type="title"/>
+          </p:nvPr>
+        </p:nvSpPr>
+        <p:spPr/>
+        <p:txBody>
+          <a:bodyPr/>
+          <a:lstStyle/>
+          <a:p>
+            <a:r>
+              <a:rPr lang="en-US" dirty="0">
+                <a:solidFill>
+                  <a:srgbClr val="007B78"/>
+                </a:solidFill>
+                <a:latin typeface="+mn-lt"/>
+                <a:ea typeface="+mn-ea"/>
+                <a:cs typeface="+mn-cs"/>
+              </a:rPr>
+              <a:t>Oh no! </a:t>
+            </a:r>
+            <a:r>
+              <a:rPr lang="en-US" dirty="0">
+                <a:solidFill>
+                  <a:srgbClr val="007B78"/>
+                </a:solidFill>
+                <a:latin typeface="+mn-lt"/>
+                <a:ea typeface="+mn-ea"/>
+                <a:cs typeface="+mn-cs"/>
+                <a:sym typeface="Wingdings" panose="05000000000000000000" pitchFamily="2" charset="2"/>
+              </a:rPr>
+              <a:t></a:t>
+            </a:r>
+            <a:endParaRPr lang="en-US" dirty="0">
+              <a:solidFill>
+                <a:srgbClr val="007B78"/>
+              </a:solidFill>
+              <a:latin typeface="+mn-lt"/>
+              <a:ea typeface="+mn-ea"/>
+              <a:cs typeface="+mn-cs"/>
+            </a:endParaRPr>
+          </a:p>
+        </p:txBody>
+      </p:sp>
+    </p:spTree>
+    <p:extLst>
+      <p:ext uri="{BB962C8B-B14F-4D97-AF65-F5344CB8AC3E}">
+        <p14:creationId xmlns:p14="http://schemas.microsoft.com/office/powerpoint/2010/main" val="898449355"/>
       </p:ext>
     </p:extLst>
   </p:cSld>
@@ -10354,6 +10510,987 @@
     <p:extLst>
       <p:ext uri="{BB962C8B-B14F-4D97-AF65-F5344CB8AC3E}">
         <p14:creationId xmlns:p14="http://schemas.microsoft.com/office/powerpoint/2010/main" val="1168478043"/>
+      </p:ext>
+    </p:extLst>
+  </p:cSld>
+  <p:clrMapOvr>
+    <a:masterClrMapping/>
+  </p:clrMapOvr>
+</p:sld>
+</file>
+
+<file path=ppt/slides/slide30.xml><?xml version="1.0" encoding="utf-8"?>
+<p:sld xmlns:a="http://schemas.openxmlformats.org/drawingml/2006/main" xmlns:r="http://schemas.openxmlformats.org/officeDocument/2006/relationships" xmlns:p="http://schemas.openxmlformats.org/presentationml/2006/main">
+  <p:cSld>
+    <p:spTree>
+      <p:nvGrpSpPr>
+        <p:cNvPr id="1" name=""/>
+        <p:cNvGrpSpPr/>
+        <p:nvPr/>
+      </p:nvGrpSpPr>
+      <p:grpSpPr>
+        <a:xfrm>
+          <a:off x="0" y="0"/>
+          <a:ext cx="0" cy="0"/>
+          <a:chOff x="0" y="0"/>
+          <a:chExt cx="0" cy="0"/>
+        </a:xfrm>
+      </p:grpSpPr>
+      <p:sp>
+        <p:nvSpPr>
+          <p:cNvPr id="6" name="Rectangle: Rounded Corners 5"/>
+          <p:cNvSpPr/>
+          <p:nvPr/>
+        </p:nvSpPr>
+        <p:spPr bwMode="auto">
+          <a:xfrm>
+            <a:off x="1049867" y="3081867"/>
+            <a:ext cx="10024533" cy="2387600"/>
+          </a:xfrm>
+          <a:prstGeom prst="roundRect">
+            <a:avLst/>
+          </a:prstGeom>
+          <a:solidFill>
+            <a:srgbClr val="000000"/>
+          </a:solidFill>
+          <a:ln w="12700" cap="flat" cmpd="sng" algn="ctr">
+            <a:noFill/>
+            <a:prstDash val="solid"/>
+            <a:round/>
+            <a:headEnd type="none" w="med" len="med"/>
+            <a:tailEnd type="none" w="med" len="med"/>
+          </a:ln>
+          <a:effectLst/>
+        </p:spPr>
+        <p:txBody>
+          <a:bodyPr vert="horz" wrap="none" lIns="72000" tIns="45720" rIns="72000" bIns="45720" numCol="1" rtlCol="0" anchor="t" anchorCtr="0" compatLnSpc="1">
+            <a:prstTxWarp prst="textNoShape">
+              <a:avLst/>
+            </a:prstTxWarp>
+          </a:bodyPr>
+          <a:lstStyle/>
+          <a:p>
+            <a:endParaRPr lang="en-US"/>
+          </a:p>
+        </p:txBody>
+      </p:sp>
+      <p:sp>
+        <p:nvSpPr>
+          <p:cNvPr id="2" name="Content Placeholder 1"/>
+          <p:cNvSpPr>
+            <a:spLocks noGrp="1"/>
+          </p:cNvSpPr>
+          <p:nvPr>
+            <p:ph idx="1"/>
+          </p:nvPr>
+        </p:nvSpPr>
+        <p:spPr/>
+        <p:txBody>
+          <a:bodyPr/>
+          <a:lstStyle/>
+          <a:p>
+            <a:r>
+              <a:rPr lang="en-US" dirty="0"/>
+              <a:t>If rebar3 is used, it is easy to add external dependencies.</a:t>
+            </a:r>
+          </a:p>
+          <a:p>
+            <a:r>
+              <a:rPr lang="en-US" dirty="0"/>
+              <a:t>Your project root has a file called </a:t>
+            </a:r>
+            <a:r>
+              <a:rPr lang="en-US" dirty="0" err="1"/>
+              <a:t>rebar.config</a:t>
+            </a:r>
+            <a:r>
+              <a:rPr lang="en-US" dirty="0"/>
+              <a:t>. Add </a:t>
+            </a:r>
+            <a:r>
+              <a:rPr lang="en-US" dirty="0" err="1"/>
+              <a:t>meck</a:t>
+            </a:r>
+            <a:r>
+              <a:rPr lang="en-US" dirty="0"/>
+              <a:t> as a dependency.</a:t>
+            </a:r>
+          </a:p>
+          <a:p>
+            <a:endParaRPr lang="en-US" dirty="0"/>
+          </a:p>
+          <a:p>
+            <a:endParaRPr lang="en-US" dirty="0"/>
+          </a:p>
+          <a:p>
+            <a:endParaRPr lang="en-US" dirty="0"/>
+          </a:p>
+          <a:p>
+            <a:endParaRPr lang="en-US" dirty="0"/>
+          </a:p>
+          <a:p>
+            <a:endParaRPr lang="en-US" dirty="0"/>
+          </a:p>
+          <a:p>
+            <a:endParaRPr lang="en-US" dirty="0"/>
+          </a:p>
+          <a:p>
+            <a:endParaRPr lang="en-US" dirty="0"/>
+          </a:p>
+          <a:p>
+            <a:pPr marL="0" indent="0">
+              <a:buNone/>
+            </a:pPr>
+            <a:r>
+              <a:rPr lang="en-US" dirty="0"/>
+              <a:t>(This will also make </a:t>
+            </a:r>
+            <a:r>
+              <a:rPr lang="en-US" dirty="0" err="1"/>
+              <a:t>meck</a:t>
+            </a:r>
+            <a:r>
+              <a:rPr lang="en-US" dirty="0"/>
+              <a:t> available in the shell if you want to play around with it)</a:t>
+            </a:r>
+          </a:p>
+        </p:txBody>
+      </p:sp>
+      <p:sp>
+        <p:nvSpPr>
+          <p:cNvPr id="3" name="Title 2"/>
+          <p:cNvSpPr>
+            <a:spLocks noGrp="1"/>
+          </p:cNvSpPr>
+          <p:nvPr>
+            <p:ph type="title"/>
+          </p:nvPr>
+        </p:nvSpPr>
+        <p:spPr/>
+        <p:txBody>
+          <a:bodyPr/>
+          <a:lstStyle/>
+          <a:p>
+            <a:r>
+              <a:rPr lang="en-US" dirty="0">
+                <a:solidFill>
+                  <a:srgbClr val="007B78"/>
+                </a:solidFill>
+                <a:latin typeface="+mn-lt"/>
+                <a:ea typeface="+mn-ea"/>
+                <a:cs typeface="+mn-cs"/>
+              </a:rPr>
+              <a:t>Dependencies</a:t>
+            </a:r>
+          </a:p>
+        </p:txBody>
+      </p:sp>
+      <p:pic>
+        <p:nvPicPr>
+          <p:cNvPr id="5" name="Picture 4"/>
+          <p:cNvPicPr>
+            <a:picLocks noChangeAspect="1"/>
+          </p:cNvPicPr>
+          <p:nvPr/>
+        </p:nvPicPr>
+        <p:blipFill>
+          <a:blip r:embed="rId2"/>
+          <a:stretch>
+            <a:fillRect/>
+          </a:stretch>
+        </p:blipFill>
+        <p:spPr>
+          <a:xfrm>
+            <a:off x="1482197" y="3429000"/>
+            <a:ext cx="9229725" cy="1790700"/>
+          </a:xfrm>
+          <a:prstGeom prst="rect">
+            <a:avLst/>
+          </a:prstGeom>
+        </p:spPr>
+      </p:pic>
+    </p:spTree>
+    <p:extLst>
+      <p:ext uri="{BB962C8B-B14F-4D97-AF65-F5344CB8AC3E}">
+        <p14:creationId xmlns:p14="http://schemas.microsoft.com/office/powerpoint/2010/main" val="1924964411"/>
+      </p:ext>
+    </p:extLst>
+  </p:cSld>
+  <p:clrMapOvr>
+    <a:masterClrMapping/>
+  </p:clrMapOvr>
+</p:sld>
+</file>
+
+<file path=ppt/slides/slide31.xml><?xml version="1.0" encoding="utf-8"?>
+<p:sld xmlns:a="http://schemas.openxmlformats.org/drawingml/2006/main" xmlns:r="http://schemas.openxmlformats.org/officeDocument/2006/relationships" xmlns:p="http://schemas.openxmlformats.org/presentationml/2006/main">
+  <p:cSld>
+    <p:spTree>
+      <p:nvGrpSpPr>
+        <p:cNvPr id="1" name=""/>
+        <p:cNvGrpSpPr/>
+        <p:nvPr/>
+      </p:nvGrpSpPr>
+      <p:grpSpPr>
+        <a:xfrm>
+          <a:off x="0" y="0"/>
+          <a:ext cx="0" cy="0"/>
+          <a:chOff x="0" y="0"/>
+          <a:chExt cx="0" cy="0"/>
+        </a:xfrm>
+      </p:grpSpPr>
+      <p:sp>
+        <p:nvSpPr>
+          <p:cNvPr id="2" name="Content Placeholder 1"/>
+          <p:cNvSpPr>
+            <a:spLocks noGrp="1"/>
+          </p:cNvSpPr>
+          <p:nvPr>
+            <p:ph idx="1"/>
+          </p:nvPr>
+        </p:nvSpPr>
+        <p:spPr/>
+        <p:txBody>
+          <a:bodyPr/>
+          <a:lstStyle/>
+          <a:p>
+            <a:r>
+              <a:rPr lang="en-US" dirty="0" err="1">
+                <a:latin typeface="Consolas" panose="020B0609020204030204" pitchFamily="49" charset="0"/>
+                <a:cs typeface="Consolas" panose="020B0609020204030204" pitchFamily="49" charset="0"/>
+              </a:rPr>
+              <a:t>meck:new</a:t>
+            </a:r>
+            <a:r>
+              <a:rPr lang="en-US" dirty="0">
+                <a:latin typeface="Consolas" panose="020B0609020204030204" pitchFamily="49" charset="0"/>
+                <a:cs typeface="Consolas" panose="020B0609020204030204" pitchFamily="49" charset="0"/>
+              </a:rPr>
+              <a:t>(Module</a:t>
+            </a:r>
+            <a:r>
+              <a:rPr lang="en-US" dirty="0"/>
+              <a:t>) will start mocking Module.</a:t>
+            </a:r>
+          </a:p>
+          <a:p>
+            <a:endParaRPr lang="en-US" dirty="0"/>
+          </a:p>
+          <a:p>
+            <a:r>
+              <a:rPr lang="en-US" dirty="0"/>
+              <a:t>The dyadic version also takes a list of options.</a:t>
+            </a:r>
+            <a:br>
+              <a:rPr lang="en-US" dirty="0"/>
+            </a:br>
+            <a:r>
+              <a:rPr lang="en-US" dirty="0" err="1">
+                <a:latin typeface="Consolas" panose="020B0609020204030204" pitchFamily="49" charset="0"/>
+                <a:cs typeface="Consolas" panose="020B0609020204030204" pitchFamily="49" charset="0"/>
+              </a:rPr>
+              <a:t>meck:new</a:t>
+            </a:r>
+            <a:r>
+              <a:rPr lang="en-US" dirty="0">
+                <a:latin typeface="Consolas" panose="020B0609020204030204" pitchFamily="49" charset="0"/>
+                <a:cs typeface="Consolas" panose="020B0609020204030204" pitchFamily="49" charset="0"/>
+              </a:rPr>
+              <a:t>(Module, Options)</a:t>
+            </a:r>
+            <a:br>
+              <a:rPr lang="en-US" dirty="0">
+                <a:latin typeface="Consolas" panose="020B0609020204030204" pitchFamily="49" charset="0"/>
+                <a:cs typeface="Consolas" panose="020B0609020204030204" pitchFamily="49" charset="0"/>
+              </a:rPr>
+            </a:br>
+            <a:r>
+              <a:rPr lang="en-US" dirty="0"/>
+              <a:t>We will look at some of the options in detail.</a:t>
+            </a:r>
+          </a:p>
+        </p:txBody>
+      </p:sp>
+      <p:sp>
+        <p:nvSpPr>
+          <p:cNvPr id="3" name="Title 2"/>
+          <p:cNvSpPr>
+            <a:spLocks noGrp="1"/>
+          </p:cNvSpPr>
+          <p:nvPr>
+            <p:ph type="title"/>
+          </p:nvPr>
+        </p:nvSpPr>
+        <p:spPr/>
+        <p:txBody>
+          <a:bodyPr/>
+          <a:lstStyle/>
+          <a:p>
+            <a:r>
+              <a:rPr lang="en-US" dirty="0" err="1">
+                <a:solidFill>
+                  <a:srgbClr val="007B78"/>
+                </a:solidFill>
+                <a:latin typeface="+mn-lt"/>
+                <a:ea typeface="+mn-ea"/>
+                <a:cs typeface="+mn-cs"/>
+              </a:rPr>
+              <a:t>meck:new</a:t>
+            </a:r>
+            <a:r>
+              <a:rPr lang="en-US" dirty="0">
+                <a:solidFill>
+                  <a:srgbClr val="007B78"/>
+                </a:solidFill>
+                <a:latin typeface="+mn-lt"/>
+                <a:ea typeface="+mn-ea"/>
+                <a:cs typeface="+mn-cs"/>
+              </a:rPr>
+              <a:t>/1 and </a:t>
+            </a:r>
+            <a:r>
+              <a:rPr lang="en-US" dirty="0" err="1">
+                <a:solidFill>
+                  <a:srgbClr val="007B78"/>
+                </a:solidFill>
+                <a:latin typeface="+mn-lt"/>
+                <a:ea typeface="+mn-ea"/>
+                <a:cs typeface="+mn-cs"/>
+              </a:rPr>
+              <a:t>meck:new</a:t>
+            </a:r>
+            <a:r>
+              <a:rPr lang="en-US" dirty="0">
+                <a:solidFill>
+                  <a:srgbClr val="007B78"/>
+                </a:solidFill>
+                <a:latin typeface="+mn-lt"/>
+                <a:ea typeface="+mn-ea"/>
+                <a:cs typeface="+mn-cs"/>
+              </a:rPr>
+              <a:t>/2</a:t>
+            </a:r>
+          </a:p>
+        </p:txBody>
+      </p:sp>
+    </p:spTree>
+    <p:extLst>
+      <p:ext uri="{BB962C8B-B14F-4D97-AF65-F5344CB8AC3E}">
+        <p14:creationId xmlns:p14="http://schemas.microsoft.com/office/powerpoint/2010/main" val="2015843137"/>
+      </p:ext>
+    </p:extLst>
+  </p:cSld>
+  <p:clrMapOvr>
+    <a:masterClrMapping/>
+  </p:clrMapOvr>
+</p:sld>
+</file>
+
+<file path=ppt/slides/slide32.xml><?xml version="1.0" encoding="utf-8"?>
+<p:sld xmlns:a="http://schemas.openxmlformats.org/drawingml/2006/main" xmlns:r="http://schemas.openxmlformats.org/officeDocument/2006/relationships" xmlns:p="http://schemas.openxmlformats.org/presentationml/2006/main">
+  <p:cSld>
+    <p:spTree>
+      <p:nvGrpSpPr>
+        <p:cNvPr id="1" name=""/>
+        <p:cNvGrpSpPr/>
+        <p:nvPr/>
+      </p:nvGrpSpPr>
+      <p:grpSpPr>
+        <a:xfrm>
+          <a:off x="0" y="0"/>
+          <a:ext cx="0" cy="0"/>
+          <a:chOff x="0" y="0"/>
+          <a:chExt cx="0" cy="0"/>
+        </a:xfrm>
+      </p:grpSpPr>
+      <p:sp>
+        <p:nvSpPr>
+          <p:cNvPr id="2" name="Content Placeholder 1"/>
+          <p:cNvSpPr>
+            <a:spLocks noGrp="1"/>
+          </p:cNvSpPr>
+          <p:nvPr>
+            <p:ph idx="1"/>
+          </p:nvPr>
+        </p:nvSpPr>
+        <p:spPr/>
+        <p:txBody>
+          <a:bodyPr/>
+          <a:lstStyle/>
+          <a:p>
+            <a:r>
+              <a:rPr lang="en-US" dirty="0" err="1">
+                <a:latin typeface="Consolas" panose="020B0609020204030204" pitchFamily="49" charset="0"/>
+                <a:cs typeface="Consolas" panose="020B0609020204030204" pitchFamily="49" charset="0"/>
+              </a:rPr>
+              <a:t>meck:expect</a:t>
+            </a:r>
+            <a:r>
+              <a:rPr lang="en-US" dirty="0">
+                <a:latin typeface="Consolas" panose="020B0609020204030204" pitchFamily="49" charset="0"/>
+                <a:cs typeface="Consolas" panose="020B0609020204030204" pitchFamily="49" charset="0"/>
+              </a:rPr>
+              <a:t>(Module, Function, Fun</a:t>
+            </a:r>
+            <a:r>
+              <a:rPr lang="en-US" dirty="0"/>
+              <a:t>) will define the behavior of a function in a mocked module.</a:t>
+            </a:r>
+            <a:br>
+              <a:rPr lang="en-US" dirty="0"/>
+            </a:br>
+            <a:br>
+              <a:rPr lang="en-US" dirty="0"/>
+            </a:br>
+            <a:r>
+              <a:rPr lang="en-US" dirty="0" err="1">
+                <a:latin typeface="Consolas" panose="020B0609020204030204" pitchFamily="49" charset="0"/>
+                <a:cs typeface="Consolas" panose="020B0609020204030204" pitchFamily="49" charset="0"/>
+              </a:rPr>
+              <a:t>meck:expect</a:t>
+            </a:r>
+            <a:r>
+              <a:rPr lang="en-US" dirty="0">
+                <a:latin typeface="Consolas" panose="020B0609020204030204" pitchFamily="49" charset="0"/>
+                <a:cs typeface="Consolas" panose="020B0609020204030204" pitchFamily="49" charset="0"/>
+              </a:rPr>
+              <a:t>(</a:t>
+            </a:r>
+            <a:r>
+              <a:rPr lang="en-US" dirty="0" err="1">
+                <a:latin typeface="Consolas" panose="020B0609020204030204" pitchFamily="49" charset="0"/>
+                <a:cs typeface="Consolas" panose="020B0609020204030204" pitchFamily="49" charset="0"/>
+              </a:rPr>
+              <a:t>my_chat_client</a:t>
+            </a:r>
+            <a:r>
+              <a:rPr lang="en-US" dirty="0">
+                <a:latin typeface="Consolas" panose="020B0609020204030204" pitchFamily="49" charset="0"/>
+                <a:cs typeface="Consolas" panose="020B0609020204030204" pitchFamily="49" charset="0"/>
+              </a:rPr>
+              <a:t>, ping, fun(_) -&gt; pong end).</a:t>
+            </a:r>
+          </a:p>
+        </p:txBody>
+      </p:sp>
+      <p:sp>
+        <p:nvSpPr>
+          <p:cNvPr id="3" name="Title 2"/>
+          <p:cNvSpPr>
+            <a:spLocks noGrp="1"/>
+          </p:cNvSpPr>
+          <p:nvPr>
+            <p:ph type="title"/>
+          </p:nvPr>
+        </p:nvSpPr>
+        <p:spPr/>
+        <p:txBody>
+          <a:bodyPr/>
+          <a:lstStyle/>
+          <a:p>
+            <a:r>
+              <a:rPr lang="en-US" dirty="0" err="1">
+                <a:solidFill>
+                  <a:srgbClr val="007B78"/>
+                </a:solidFill>
+                <a:latin typeface="+mn-lt"/>
+                <a:ea typeface="+mn-ea"/>
+                <a:cs typeface="+mn-cs"/>
+              </a:rPr>
+              <a:t>meck:expect</a:t>
+            </a:r>
+            <a:r>
+              <a:rPr lang="en-US" dirty="0">
+                <a:solidFill>
+                  <a:srgbClr val="007B78"/>
+                </a:solidFill>
+                <a:latin typeface="+mn-lt"/>
+                <a:ea typeface="+mn-ea"/>
+                <a:cs typeface="+mn-cs"/>
+              </a:rPr>
+              <a:t>/3</a:t>
+            </a:r>
+          </a:p>
+        </p:txBody>
+      </p:sp>
+    </p:spTree>
+    <p:extLst>
+      <p:ext uri="{BB962C8B-B14F-4D97-AF65-F5344CB8AC3E}">
+        <p14:creationId xmlns:p14="http://schemas.microsoft.com/office/powerpoint/2010/main" val="3714116135"/>
+      </p:ext>
+    </p:extLst>
+  </p:cSld>
+  <p:clrMapOvr>
+    <a:masterClrMapping/>
+  </p:clrMapOvr>
+</p:sld>
+</file>
+
+<file path=ppt/slides/slide33.xml><?xml version="1.0" encoding="utf-8"?>
+<p:sld xmlns:a="http://schemas.openxmlformats.org/drawingml/2006/main" xmlns:r="http://schemas.openxmlformats.org/officeDocument/2006/relationships" xmlns:p="http://schemas.openxmlformats.org/presentationml/2006/main">
+  <p:cSld>
+    <p:spTree>
+      <p:nvGrpSpPr>
+        <p:cNvPr id="1" name=""/>
+        <p:cNvGrpSpPr/>
+        <p:nvPr/>
+      </p:nvGrpSpPr>
+      <p:grpSpPr>
+        <a:xfrm>
+          <a:off x="0" y="0"/>
+          <a:ext cx="0" cy="0"/>
+          <a:chOff x="0" y="0"/>
+          <a:chExt cx="0" cy="0"/>
+        </a:xfrm>
+      </p:grpSpPr>
+      <p:sp>
+        <p:nvSpPr>
+          <p:cNvPr id="2" name="Content Placeholder 1"/>
+          <p:cNvSpPr>
+            <a:spLocks noGrp="1"/>
+          </p:cNvSpPr>
+          <p:nvPr>
+            <p:ph idx="1"/>
+          </p:nvPr>
+        </p:nvSpPr>
+        <p:spPr/>
+        <p:txBody>
+          <a:bodyPr/>
+          <a:lstStyle/>
+          <a:p>
+            <a:r>
+              <a:rPr lang="en-US" dirty="0"/>
+              <a:t>If a module is mocked, by default, </a:t>
+            </a:r>
+            <a:r>
+              <a:rPr lang="en-US" i="1" dirty="0"/>
+              <a:t>all </a:t>
+            </a:r>
+            <a:r>
+              <a:rPr lang="en-US" dirty="0"/>
+              <a:t>functionality will be replaced by the mocked instance of the module.</a:t>
+            </a:r>
+          </a:p>
+          <a:p>
+            <a:r>
+              <a:rPr lang="en-US" dirty="0"/>
+              <a:t>What if we just want to mock some functionality?</a:t>
+            </a:r>
+          </a:p>
+          <a:p>
+            <a:r>
+              <a:rPr lang="en-US" dirty="0"/>
+              <a:t>The </a:t>
+            </a:r>
+            <a:r>
+              <a:rPr lang="en-US" dirty="0" err="1"/>
+              <a:t>passthrough</a:t>
+            </a:r>
+            <a:r>
+              <a:rPr lang="en-US" dirty="0"/>
+              <a:t> option keeps all functionality of a module intact, unless it has been explicitly overwritten by </a:t>
+            </a:r>
+            <a:r>
+              <a:rPr lang="en-US" dirty="0" err="1"/>
+              <a:t>meck:expect</a:t>
+            </a:r>
+            <a:r>
+              <a:rPr lang="en-US" dirty="0"/>
+              <a:t>/3.</a:t>
+            </a:r>
+            <a:br>
+              <a:rPr lang="en-US" dirty="0"/>
+            </a:br>
+            <a:br>
+              <a:rPr lang="en-US" dirty="0">
+                <a:latin typeface="Consolas" panose="020B0609020204030204" pitchFamily="49" charset="0"/>
+                <a:cs typeface="Consolas" panose="020B0609020204030204" pitchFamily="49" charset="0"/>
+              </a:rPr>
+            </a:br>
+            <a:r>
+              <a:rPr lang="en-US" dirty="0" err="1">
+                <a:latin typeface="Consolas" panose="020B0609020204030204" pitchFamily="49" charset="0"/>
+                <a:cs typeface="Consolas" panose="020B0609020204030204" pitchFamily="49" charset="0"/>
+              </a:rPr>
+              <a:t>meck:new</a:t>
+            </a:r>
+            <a:r>
+              <a:rPr lang="en-US" dirty="0">
+                <a:latin typeface="Consolas" panose="020B0609020204030204" pitchFamily="49" charset="0"/>
+                <a:cs typeface="Consolas" panose="020B0609020204030204" pitchFamily="49" charset="0"/>
+              </a:rPr>
+              <a:t>(</a:t>
+            </a:r>
+            <a:r>
+              <a:rPr lang="en-US" dirty="0" err="1">
+                <a:latin typeface="Consolas" panose="020B0609020204030204" pitchFamily="49" charset="0"/>
+                <a:cs typeface="Consolas" panose="020B0609020204030204" pitchFamily="49" charset="0"/>
+              </a:rPr>
+              <a:t>my_chat_client</a:t>
+            </a:r>
+            <a:r>
+              <a:rPr lang="en-US" dirty="0">
+                <a:latin typeface="Consolas" panose="020B0609020204030204" pitchFamily="49" charset="0"/>
+                <a:cs typeface="Consolas" panose="020B0609020204030204" pitchFamily="49" charset="0"/>
+              </a:rPr>
+              <a:t>, [</a:t>
+            </a:r>
+            <a:r>
+              <a:rPr lang="en-US" dirty="0" err="1">
+                <a:latin typeface="Consolas" panose="020B0609020204030204" pitchFamily="49" charset="0"/>
+                <a:cs typeface="Consolas" panose="020B0609020204030204" pitchFamily="49" charset="0"/>
+              </a:rPr>
+              <a:t>passthrough</a:t>
+            </a:r>
+            <a:r>
+              <a:rPr lang="en-US" dirty="0">
+                <a:latin typeface="Consolas" panose="020B0609020204030204" pitchFamily="49" charset="0"/>
+                <a:cs typeface="Consolas" panose="020B0609020204030204" pitchFamily="49" charset="0"/>
+              </a:rPr>
+              <a:t>]),</a:t>
+            </a:r>
+            <a:br>
+              <a:rPr lang="en-US" dirty="0">
+                <a:latin typeface="Consolas" panose="020B0609020204030204" pitchFamily="49" charset="0"/>
+                <a:cs typeface="Consolas" panose="020B0609020204030204" pitchFamily="49" charset="0"/>
+              </a:rPr>
+            </a:br>
+            <a:r>
+              <a:rPr lang="en-US" dirty="0" err="1">
+                <a:latin typeface="Consolas" panose="020B0609020204030204" pitchFamily="49" charset="0"/>
+                <a:cs typeface="Consolas" panose="020B0609020204030204" pitchFamily="49" charset="0"/>
+              </a:rPr>
+              <a:t>meck:expect</a:t>
+            </a:r>
+            <a:r>
+              <a:rPr lang="en-US" dirty="0">
+                <a:latin typeface="Consolas" panose="020B0609020204030204" pitchFamily="49" charset="0"/>
+                <a:cs typeface="Consolas" panose="020B0609020204030204" pitchFamily="49" charset="0"/>
+              </a:rPr>
+              <a:t>(</a:t>
+            </a:r>
+            <a:r>
+              <a:rPr lang="en-US" dirty="0" err="1">
+                <a:latin typeface="Consolas" panose="020B0609020204030204" pitchFamily="49" charset="0"/>
+                <a:cs typeface="Consolas" panose="020B0609020204030204" pitchFamily="49" charset="0"/>
+              </a:rPr>
+              <a:t>my_chat_client</a:t>
+            </a:r>
+            <a:r>
+              <a:rPr lang="en-US" dirty="0">
+                <a:latin typeface="Consolas" panose="020B0609020204030204" pitchFamily="49" charset="0"/>
+                <a:cs typeface="Consolas" panose="020B0609020204030204" pitchFamily="49" charset="0"/>
+              </a:rPr>
+              <a:t>, ping, fun(_) -&gt; pong end).</a:t>
+            </a:r>
+          </a:p>
+          <a:p>
+            <a:endParaRPr lang="en-US" dirty="0"/>
+          </a:p>
+        </p:txBody>
+      </p:sp>
+      <p:sp>
+        <p:nvSpPr>
+          <p:cNvPr id="3" name="Title 2"/>
+          <p:cNvSpPr>
+            <a:spLocks noGrp="1"/>
+          </p:cNvSpPr>
+          <p:nvPr>
+            <p:ph type="title"/>
+          </p:nvPr>
+        </p:nvSpPr>
+        <p:spPr/>
+        <p:txBody>
+          <a:bodyPr/>
+          <a:lstStyle/>
+          <a:p>
+            <a:r>
+              <a:rPr lang="en-US" dirty="0">
+                <a:solidFill>
+                  <a:srgbClr val="007B78"/>
+                </a:solidFill>
+                <a:latin typeface="+mn-lt"/>
+                <a:ea typeface="+mn-ea"/>
+                <a:cs typeface="+mn-cs"/>
+              </a:rPr>
+              <a:t>Options – </a:t>
+            </a:r>
+            <a:r>
+              <a:rPr lang="en-US" dirty="0" err="1">
+                <a:solidFill>
+                  <a:srgbClr val="007B78"/>
+                </a:solidFill>
+                <a:latin typeface="+mn-lt"/>
+                <a:ea typeface="+mn-ea"/>
+                <a:cs typeface="+mn-cs"/>
+              </a:rPr>
+              <a:t>passthrough</a:t>
+            </a:r>
+            <a:endParaRPr lang="en-US" dirty="0">
+              <a:solidFill>
+                <a:srgbClr val="007B78"/>
+              </a:solidFill>
+              <a:latin typeface="+mn-lt"/>
+              <a:ea typeface="+mn-ea"/>
+              <a:cs typeface="+mn-cs"/>
+            </a:endParaRPr>
+          </a:p>
+        </p:txBody>
+      </p:sp>
+    </p:spTree>
+    <p:extLst>
+      <p:ext uri="{BB962C8B-B14F-4D97-AF65-F5344CB8AC3E}">
+        <p14:creationId xmlns:p14="http://schemas.microsoft.com/office/powerpoint/2010/main" val="174357172"/>
+      </p:ext>
+    </p:extLst>
+  </p:cSld>
+  <p:clrMapOvr>
+    <a:masterClrMapping/>
+  </p:clrMapOvr>
+</p:sld>
+</file>
+
+<file path=ppt/slides/slide34.xml><?xml version="1.0" encoding="utf-8"?>
+<p:sld xmlns:a="http://schemas.openxmlformats.org/drawingml/2006/main" xmlns:r="http://schemas.openxmlformats.org/officeDocument/2006/relationships" xmlns:p="http://schemas.openxmlformats.org/presentationml/2006/main">
+  <p:cSld>
+    <p:spTree>
+      <p:nvGrpSpPr>
+        <p:cNvPr id="1" name=""/>
+        <p:cNvGrpSpPr/>
+        <p:nvPr/>
+      </p:nvGrpSpPr>
+      <p:grpSpPr>
+        <a:xfrm>
+          <a:off x="0" y="0"/>
+          <a:ext cx="0" cy="0"/>
+          <a:chOff x="0" y="0"/>
+          <a:chExt cx="0" cy="0"/>
+        </a:xfrm>
+      </p:grpSpPr>
+      <p:sp>
+        <p:nvSpPr>
+          <p:cNvPr id="2" name="Content Placeholder 1"/>
+          <p:cNvSpPr>
+            <a:spLocks noGrp="1"/>
+          </p:cNvSpPr>
+          <p:nvPr>
+            <p:ph idx="1"/>
+          </p:nvPr>
+        </p:nvSpPr>
+        <p:spPr/>
+        <p:txBody>
+          <a:bodyPr/>
+          <a:lstStyle/>
+          <a:p>
+            <a:r>
+              <a:rPr lang="en-US" dirty="0"/>
+              <a:t>It is possible to mock modules that do not even exist. This is done with the option </a:t>
+            </a:r>
+            <a:r>
+              <a:rPr lang="en-US" dirty="0" err="1"/>
+              <a:t>non_strict</a:t>
+            </a:r>
+            <a:r>
+              <a:rPr lang="en-US" dirty="0"/>
+              <a:t>.</a:t>
+            </a:r>
+            <a:br>
+              <a:rPr lang="en-US" dirty="0"/>
+            </a:br>
+            <a:br>
+              <a:rPr lang="en-US" dirty="0">
+                <a:latin typeface="Consolas" panose="020B0609020204030204" pitchFamily="49" charset="0"/>
+                <a:cs typeface="Consolas" panose="020B0609020204030204" pitchFamily="49" charset="0"/>
+              </a:rPr>
+            </a:br>
+            <a:r>
+              <a:rPr lang="en-US" dirty="0" err="1">
+                <a:latin typeface="Consolas" panose="020B0609020204030204" pitchFamily="49" charset="0"/>
+                <a:cs typeface="Consolas" panose="020B0609020204030204" pitchFamily="49" charset="0"/>
+              </a:rPr>
+              <a:t>meck:new</a:t>
+            </a:r>
+            <a:r>
+              <a:rPr lang="en-US" dirty="0">
+                <a:latin typeface="Consolas" panose="020B0609020204030204" pitchFamily="49" charset="0"/>
+                <a:cs typeface="Consolas" panose="020B0609020204030204" pitchFamily="49" charset="0"/>
+              </a:rPr>
+              <a:t>(</a:t>
+            </a:r>
+            <a:r>
+              <a:rPr lang="en-US" dirty="0" err="1">
+                <a:latin typeface="Consolas" panose="020B0609020204030204" pitchFamily="49" charset="0"/>
+                <a:cs typeface="Consolas" panose="020B0609020204030204" pitchFamily="49" charset="0"/>
+              </a:rPr>
+              <a:t>better_lists</a:t>
+            </a:r>
+            <a:r>
+              <a:rPr lang="en-US" dirty="0">
+                <a:latin typeface="Consolas" panose="020B0609020204030204" pitchFamily="49" charset="0"/>
+                <a:cs typeface="Consolas" panose="020B0609020204030204" pitchFamily="49" charset="0"/>
+              </a:rPr>
+              <a:t>, [</a:t>
+            </a:r>
+            <a:r>
+              <a:rPr lang="en-US" dirty="0" err="1">
+                <a:latin typeface="Consolas" panose="020B0609020204030204" pitchFamily="49" charset="0"/>
+                <a:cs typeface="Consolas" panose="020B0609020204030204" pitchFamily="49" charset="0"/>
+              </a:rPr>
+              <a:t>non_strict</a:t>
+            </a:r>
+            <a:r>
+              <a:rPr lang="en-US" dirty="0">
+                <a:latin typeface="Consolas" panose="020B0609020204030204" pitchFamily="49" charset="0"/>
+                <a:cs typeface="Consolas" panose="020B0609020204030204" pitchFamily="49" charset="0"/>
+              </a:rPr>
+              <a:t>]),</a:t>
+            </a:r>
+            <a:br>
+              <a:rPr lang="en-US" dirty="0">
+                <a:latin typeface="Consolas" panose="020B0609020204030204" pitchFamily="49" charset="0"/>
+                <a:cs typeface="Consolas" panose="020B0609020204030204" pitchFamily="49" charset="0"/>
+              </a:rPr>
+            </a:br>
+            <a:r>
+              <a:rPr lang="en-US" dirty="0" err="1">
+                <a:latin typeface="Consolas" panose="020B0609020204030204" pitchFamily="49" charset="0"/>
+                <a:cs typeface="Consolas" panose="020B0609020204030204" pitchFamily="49" charset="0"/>
+              </a:rPr>
+              <a:t>meck:expect</a:t>
+            </a:r>
+            <a:r>
+              <a:rPr lang="en-US" dirty="0">
+                <a:latin typeface="Consolas" panose="020B0609020204030204" pitchFamily="49" charset="0"/>
+                <a:cs typeface="Consolas" panose="020B0609020204030204" pitchFamily="49" charset="0"/>
+              </a:rPr>
+              <a:t>(</a:t>
+            </a:r>
+            <a:r>
+              <a:rPr lang="en-US" dirty="0" err="1">
+                <a:latin typeface="Consolas" panose="020B0609020204030204" pitchFamily="49" charset="0"/>
+                <a:cs typeface="Consolas" panose="020B0609020204030204" pitchFamily="49" charset="0"/>
+              </a:rPr>
+              <a:t>better_lists</a:t>
+            </a:r>
+            <a:r>
+              <a:rPr lang="en-US" dirty="0">
+                <a:latin typeface="Consolas" panose="020B0609020204030204" pitchFamily="49" charset="0"/>
+                <a:cs typeface="Consolas" panose="020B0609020204030204" pitchFamily="49" charset="0"/>
+              </a:rPr>
+              <a:t>,</a:t>
+            </a:r>
+            <a:br>
+              <a:rPr lang="en-US" dirty="0">
+                <a:latin typeface="Consolas" panose="020B0609020204030204" pitchFamily="49" charset="0"/>
+                <a:cs typeface="Consolas" panose="020B0609020204030204" pitchFamily="49" charset="0"/>
+              </a:rPr>
+            </a:br>
+            <a:r>
+              <a:rPr lang="en-US" dirty="0">
+                <a:latin typeface="Consolas" panose="020B0609020204030204" pitchFamily="49" charset="0"/>
+                <a:cs typeface="Consolas" panose="020B0609020204030204" pitchFamily="49" charset="0"/>
+              </a:rPr>
+              <a:t>            </a:t>
+            </a:r>
+            <a:r>
+              <a:rPr lang="en-US" dirty="0" err="1">
+                <a:latin typeface="Consolas" panose="020B0609020204030204" pitchFamily="49" charset="0"/>
+                <a:cs typeface="Consolas" panose="020B0609020204030204" pitchFamily="49" charset="0"/>
+              </a:rPr>
+              <a:t>better_sort</a:t>
+            </a:r>
+            <a:r>
+              <a:rPr lang="en-US" dirty="0">
+                <a:latin typeface="Consolas" panose="020B0609020204030204" pitchFamily="49" charset="0"/>
+                <a:cs typeface="Consolas" panose="020B0609020204030204" pitchFamily="49" charset="0"/>
+              </a:rPr>
+              <a:t>,</a:t>
+            </a:r>
+            <a:br>
+              <a:rPr lang="en-US" dirty="0">
+                <a:latin typeface="Consolas" panose="020B0609020204030204" pitchFamily="49" charset="0"/>
+                <a:cs typeface="Consolas" panose="020B0609020204030204" pitchFamily="49" charset="0"/>
+              </a:rPr>
+            </a:br>
+            <a:r>
+              <a:rPr lang="en-US" dirty="0">
+                <a:latin typeface="Consolas" panose="020B0609020204030204" pitchFamily="49" charset="0"/>
+                <a:cs typeface="Consolas" panose="020B0609020204030204" pitchFamily="49" charset="0"/>
+              </a:rPr>
+              <a:t>            fun </a:t>
+            </a:r>
+            <a:r>
+              <a:rPr lang="en-US" dirty="0" err="1">
+                <a:latin typeface="Consolas" panose="020B0609020204030204" pitchFamily="49" charset="0"/>
+                <a:cs typeface="Consolas" panose="020B0609020204030204" pitchFamily="49" charset="0"/>
+              </a:rPr>
+              <a:t>super_quicksort</a:t>
+            </a:r>
+            <a:r>
+              <a:rPr lang="en-US" dirty="0">
+                <a:latin typeface="Consolas" panose="020B0609020204030204" pitchFamily="49" charset="0"/>
+                <a:cs typeface="Consolas" panose="020B0609020204030204" pitchFamily="49" charset="0"/>
+              </a:rPr>
+              <a:t>/1).</a:t>
+            </a:r>
+          </a:p>
+          <a:p>
+            <a:endParaRPr lang="en-US" dirty="0"/>
+          </a:p>
+        </p:txBody>
+      </p:sp>
+      <p:sp>
+        <p:nvSpPr>
+          <p:cNvPr id="3" name="Title 2"/>
+          <p:cNvSpPr>
+            <a:spLocks noGrp="1"/>
+          </p:cNvSpPr>
+          <p:nvPr>
+            <p:ph type="title"/>
+          </p:nvPr>
+        </p:nvSpPr>
+        <p:spPr/>
+        <p:txBody>
+          <a:bodyPr/>
+          <a:lstStyle/>
+          <a:p>
+            <a:r>
+              <a:rPr lang="en-US" dirty="0">
+                <a:solidFill>
+                  <a:srgbClr val="007B78"/>
+                </a:solidFill>
+                <a:latin typeface="+mn-lt"/>
+                <a:ea typeface="+mn-ea"/>
+                <a:cs typeface="+mn-cs"/>
+              </a:rPr>
+              <a:t>Options – </a:t>
+            </a:r>
+            <a:r>
+              <a:rPr lang="en-US" dirty="0" err="1">
+                <a:solidFill>
+                  <a:srgbClr val="007B78"/>
+                </a:solidFill>
+                <a:latin typeface="+mn-lt"/>
+                <a:ea typeface="+mn-ea"/>
+                <a:cs typeface="+mn-cs"/>
+              </a:rPr>
+              <a:t>non_strict</a:t>
+            </a:r>
+            <a:endParaRPr lang="en-US" dirty="0">
+              <a:solidFill>
+                <a:srgbClr val="007B78"/>
+              </a:solidFill>
+              <a:latin typeface="+mn-lt"/>
+              <a:ea typeface="+mn-ea"/>
+              <a:cs typeface="+mn-cs"/>
+            </a:endParaRPr>
+          </a:p>
+        </p:txBody>
+      </p:sp>
+    </p:spTree>
+    <p:extLst>
+      <p:ext uri="{BB962C8B-B14F-4D97-AF65-F5344CB8AC3E}">
+        <p14:creationId xmlns:p14="http://schemas.microsoft.com/office/powerpoint/2010/main" val="394629017"/>
       </p:ext>
     </p:extLst>
   </p:cSld>

</xml_diff>

<commit_message>
Updates presentation and tests with meck stuff
</commit_message>
<xml_diff>
--- a/basic_erlang_4/presentation/erlang_part_4_testing.pptx
+++ b/basic_erlang_4/presentation/erlang_part_4_testing.pptx
@@ -5,10 +5,10 @@
     <p:sldMasterId id="2147483676" r:id="rId1"/>
   </p:sldMasterIdLst>
   <p:notesMasterIdLst>
-    <p:notesMasterId r:id="rId36"/>
+    <p:notesMasterId r:id="rId38"/>
   </p:notesMasterIdLst>
   <p:handoutMasterIdLst>
-    <p:handoutMasterId r:id="rId37"/>
+    <p:handoutMasterId r:id="rId39"/>
   </p:handoutMasterIdLst>
   <p:sldIdLst>
     <p:sldId id="259" r:id="rId2"/>
@@ -45,20 +45,22 @@
     <p:sldId id="291" r:id="rId33"/>
     <p:sldId id="292" r:id="rId34"/>
     <p:sldId id="293" r:id="rId35"/>
+    <p:sldId id="294" r:id="rId36"/>
+    <p:sldId id="295" r:id="rId37"/>
   </p:sldIdLst>
   <p:sldSz cx="12192000" cy="6858000"/>
   <p:notesSz cx="6884988" cy="10018713"/>
   <p:embeddedFontLst>
     <p:embeddedFont>
       <p:font typeface="Consolas" panose="020B0609020204030204" pitchFamily="49" charset="0"/>
-      <p:regular r:id="rId38"/>
-      <p:bold r:id="rId39"/>
-      <p:italic r:id="rId40"/>
-      <p:boldItalic r:id="rId41"/>
+      <p:regular r:id="rId40"/>
+      <p:bold r:id="rId41"/>
+      <p:italic r:id="rId42"/>
+      <p:boldItalic r:id="rId43"/>
     </p:embeddedFont>
     <p:embeddedFont>
       <p:font typeface="Ericsson Capital TT" panose="02000503000000020004" pitchFamily="2" charset="0"/>
-      <p:regular r:id="rId42"/>
+      <p:regular r:id="rId44"/>
     </p:embeddedFont>
   </p:embeddedFontLst>
   <p:defaultTextStyle>
@@ -225,6 +227,8 @@
             <p14:sldId id="291"/>
             <p14:sldId id="292"/>
             <p14:sldId id="293"/>
+            <p14:sldId id="294"/>
+            <p14:sldId id="295"/>
           </p14:sldIdLst>
         </p14:section>
       </p14:sectionLst>
@@ -10538,6 +10542,88 @@
       </p:grpSpPr>
       <p:sp>
         <p:nvSpPr>
+          <p:cNvPr id="2" name="Content Placeholder 1"/>
+          <p:cNvSpPr>
+            <a:spLocks noGrp="1"/>
+          </p:cNvSpPr>
+          <p:nvPr>
+            <p:ph idx="1"/>
+          </p:nvPr>
+        </p:nvSpPr>
+        <p:spPr/>
+        <p:txBody>
+          <a:bodyPr/>
+          <a:lstStyle/>
+          <a:p>
+            <a:r>
+              <a:rPr lang="en-US" dirty="0"/>
+              <a:t>If rebar3 is used, it is easy to add external dependencies.</a:t>
+            </a:r>
+          </a:p>
+          <a:p>
+            <a:r>
+              <a:rPr lang="en-US" dirty="0"/>
+              <a:t>Your project root has a file called </a:t>
+            </a:r>
+            <a:r>
+              <a:rPr lang="en-US" dirty="0" err="1"/>
+              <a:t>rebar.config</a:t>
+            </a:r>
+            <a:r>
+              <a:rPr lang="en-US" dirty="0"/>
+              <a:t>. Add </a:t>
+            </a:r>
+            <a:r>
+              <a:rPr lang="en-US" dirty="0" err="1"/>
+              <a:t>meck</a:t>
+            </a:r>
+            <a:r>
+              <a:rPr lang="en-US" dirty="0"/>
+              <a:t> as a dependency.</a:t>
+            </a:r>
+          </a:p>
+          <a:p>
+            <a:endParaRPr lang="en-US" dirty="0"/>
+          </a:p>
+          <a:p>
+            <a:endParaRPr lang="en-US" dirty="0"/>
+          </a:p>
+          <a:p>
+            <a:endParaRPr lang="en-US" dirty="0"/>
+          </a:p>
+          <a:p>
+            <a:endParaRPr lang="en-US" dirty="0"/>
+          </a:p>
+          <a:p>
+            <a:endParaRPr lang="en-US" dirty="0"/>
+          </a:p>
+          <a:p>
+            <a:endParaRPr lang="en-US" dirty="0"/>
+          </a:p>
+          <a:p>
+            <a:endParaRPr lang="en-US" dirty="0"/>
+          </a:p>
+          <a:p>
+            <a:pPr marL="0" indent="0">
+              <a:buNone/>
+            </a:pPr>
+            <a:r>
+              <a:rPr lang="en-US" dirty="0"/>
+              <a:t>(This will also make </a:t>
+            </a:r>
+            <a:r>
+              <a:rPr lang="en-US" dirty="0" err="1"/>
+              <a:t>meck</a:t>
+            </a:r>
+            <a:r>
+              <a:rPr lang="en-US" dirty="0"/>
+              <a:t> available in the shell if you want to play around with it)</a:t>
+            </a:r>
+          </a:p>
+        </p:txBody>
+      </p:sp>
+      <p:sp>
+        <p:nvSpPr>
           <p:cNvPr id="6" name="Rectangle: Rounded Corners 5"/>
           <p:cNvSpPr/>
           <p:nvPr/>
@@ -10571,88 +10657,6 @@
           <a:lstStyle/>
           <a:p>
             <a:endParaRPr lang="en-US"/>
-          </a:p>
-        </p:txBody>
-      </p:sp>
-      <p:sp>
-        <p:nvSpPr>
-          <p:cNvPr id="2" name="Content Placeholder 1"/>
-          <p:cNvSpPr>
-            <a:spLocks noGrp="1"/>
-          </p:cNvSpPr>
-          <p:nvPr>
-            <p:ph idx="1"/>
-          </p:nvPr>
-        </p:nvSpPr>
-        <p:spPr/>
-        <p:txBody>
-          <a:bodyPr/>
-          <a:lstStyle/>
-          <a:p>
-            <a:r>
-              <a:rPr lang="en-US" dirty="0"/>
-              <a:t>If rebar3 is used, it is easy to add external dependencies.</a:t>
-            </a:r>
-          </a:p>
-          <a:p>
-            <a:r>
-              <a:rPr lang="en-US" dirty="0"/>
-              <a:t>Your project root has a file called </a:t>
-            </a:r>
-            <a:r>
-              <a:rPr lang="en-US" dirty="0" err="1"/>
-              <a:t>rebar.config</a:t>
-            </a:r>
-            <a:r>
-              <a:rPr lang="en-US" dirty="0"/>
-              <a:t>. Add </a:t>
-            </a:r>
-            <a:r>
-              <a:rPr lang="en-US" dirty="0" err="1"/>
-              <a:t>meck</a:t>
-            </a:r>
-            <a:r>
-              <a:rPr lang="en-US" dirty="0"/>
-              <a:t> as a dependency.</a:t>
-            </a:r>
-          </a:p>
-          <a:p>
-            <a:endParaRPr lang="en-US" dirty="0"/>
-          </a:p>
-          <a:p>
-            <a:endParaRPr lang="en-US" dirty="0"/>
-          </a:p>
-          <a:p>
-            <a:endParaRPr lang="en-US" dirty="0"/>
-          </a:p>
-          <a:p>
-            <a:endParaRPr lang="en-US" dirty="0"/>
-          </a:p>
-          <a:p>
-            <a:endParaRPr lang="en-US" dirty="0"/>
-          </a:p>
-          <a:p>
-            <a:endParaRPr lang="en-US" dirty="0"/>
-          </a:p>
-          <a:p>
-            <a:endParaRPr lang="en-US" dirty="0"/>
-          </a:p>
-          <a:p>
-            <a:pPr marL="0" indent="0">
-              <a:buNone/>
-            </a:pPr>
-            <a:r>
-              <a:rPr lang="en-US" dirty="0"/>
-              <a:t>(This will also make </a:t>
-            </a:r>
-            <a:r>
-              <a:rPr lang="en-US" dirty="0" err="1"/>
-              <a:t>meck</a:t>
-            </a:r>
-            <a:r>
-              <a:rPr lang="en-US" dirty="0"/>
-              <a:t> available in the shell if you want to play around with it)</a:t>
-            </a:r>
           </a:p>
         </p:txBody>
       </p:sp>
@@ -10905,6 +10909,44 @@
       </p:grpSpPr>
       <p:sp>
         <p:nvSpPr>
+          <p:cNvPr id="5" name="Rectangle: Rounded Corners 4"/>
+          <p:cNvSpPr/>
+          <p:nvPr/>
+        </p:nvSpPr>
+        <p:spPr bwMode="auto">
+          <a:xfrm>
+            <a:off x="2777068" y="3081867"/>
+            <a:ext cx="5520266" cy="1998133"/>
+          </a:xfrm>
+          <a:prstGeom prst="roundRect">
+            <a:avLst/>
+          </a:prstGeom>
+          <a:solidFill>
+            <a:srgbClr val="000000"/>
+          </a:solidFill>
+          <a:ln w="12700" cap="flat" cmpd="sng" algn="ctr">
+            <a:noFill/>
+            <a:prstDash val="solid"/>
+            <a:round/>
+            <a:headEnd type="none" w="med" len="med"/>
+            <a:tailEnd type="none" w="med" len="med"/>
+          </a:ln>
+          <a:effectLst/>
+        </p:spPr>
+        <p:txBody>
+          <a:bodyPr vert="horz" wrap="none" lIns="72000" tIns="45720" rIns="72000" bIns="45720" numCol="1" rtlCol="0" anchor="t" anchorCtr="0" compatLnSpc="1">
+            <a:prstTxWarp prst="textNoShape">
+              <a:avLst/>
+            </a:prstTxWarp>
+          </a:bodyPr>
+          <a:lstStyle/>
+          <a:p>
+            <a:endParaRPr lang="en-US"/>
+          </a:p>
+        </p:txBody>
+      </p:sp>
+      <p:sp>
+        <p:nvSpPr>
           <p:cNvPr id="2" name="Content Placeholder 1"/>
           <p:cNvSpPr>
             <a:spLocks noGrp="1"/>
@@ -10936,40 +10978,10 @@
               <a:rPr lang="en-US" dirty="0"/>
               <a:t>) will define the behavior of a function in a mocked module.</a:t>
             </a:r>
-            <a:br>
-              <a:rPr lang="en-US" dirty="0"/>
-            </a:br>
-            <a:br>
-              <a:rPr lang="en-US" dirty="0"/>
-            </a:br>
-            <a:r>
-              <a:rPr lang="en-US" dirty="0" err="1">
-                <a:latin typeface="Consolas" panose="020B0609020204030204" pitchFamily="49" charset="0"/>
-                <a:cs typeface="Consolas" panose="020B0609020204030204" pitchFamily="49" charset="0"/>
-              </a:rPr>
-              <a:t>meck:expect</a:t>
-            </a:r>
-            <a:r>
-              <a:rPr lang="en-US" dirty="0">
-                <a:latin typeface="Consolas" panose="020B0609020204030204" pitchFamily="49" charset="0"/>
-                <a:cs typeface="Consolas" panose="020B0609020204030204" pitchFamily="49" charset="0"/>
-              </a:rPr>
-              <a:t>(</a:t>
-            </a:r>
-            <a:r>
-              <a:rPr lang="en-US" dirty="0" err="1">
-                <a:latin typeface="Consolas" panose="020B0609020204030204" pitchFamily="49" charset="0"/>
-                <a:cs typeface="Consolas" panose="020B0609020204030204" pitchFamily="49" charset="0"/>
-              </a:rPr>
-              <a:t>my_chat_client</a:t>
-            </a:r>
-            <a:r>
-              <a:rPr lang="en-US" dirty="0">
-                <a:latin typeface="Consolas" panose="020B0609020204030204" pitchFamily="49" charset="0"/>
-                <a:cs typeface="Consolas" panose="020B0609020204030204" pitchFamily="49" charset="0"/>
-              </a:rPr>
-              <a:t>, ping, fun(_) -&gt; pong end).</a:t>
-            </a:r>
+            <a:endParaRPr lang="en-US" dirty="0">
+              <a:latin typeface="Consolas" panose="020B0609020204030204" pitchFamily="49" charset="0"/>
+              <a:cs typeface="Consolas" panose="020B0609020204030204" pitchFamily="49" charset="0"/>
+            </a:endParaRPr>
           </a:p>
         </p:txBody>
       </p:sp>
@@ -11013,6 +11025,30 @@
           </a:p>
         </p:txBody>
       </p:sp>
+      <p:pic>
+        <p:nvPicPr>
+          <p:cNvPr id="4" name="Picture 3"/>
+          <p:cNvPicPr>
+            <a:picLocks noChangeAspect="1"/>
+          </p:cNvPicPr>
+          <p:nvPr/>
+        </p:nvPicPr>
+        <p:blipFill>
+          <a:blip r:embed="rId2"/>
+          <a:stretch>
+            <a:fillRect/>
+          </a:stretch>
+        </p:blipFill>
+        <p:spPr>
+          <a:xfrm>
+            <a:off x="3016252" y="3303587"/>
+            <a:ext cx="5010150" cy="1571625"/>
+          </a:xfrm>
+          <a:prstGeom prst="rect">
+            <a:avLst/>
+          </a:prstGeom>
+        </p:spPr>
+      </p:pic>
     </p:spTree>
     <p:extLst>
       <p:ext uri="{BB962C8B-B14F-4D97-AF65-F5344CB8AC3E}">
@@ -11269,6 +11305,44 @@
       </p:grpSpPr>
       <p:sp>
         <p:nvSpPr>
+          <p:cNvPr id="5" name="Rectangle: Rounded Corners 4"/>
+          <p:cNvSpPr/>
+          <p:nvPr/>
+        </p:nvSpPr>
+        <p:spPr bwMode="auto">
+          <a:xfrm>
+            <a:off x="1913467" y="3234266"/>
+            <a:ext cx="8331200" cy="1303867"/>
+          </a:xfrm>
+          <a:prstGeom prst="roundRect">
+            <a:avLst/>
+          </a:prstGeom>
+          <a:solidFill>
+            <a:srgbClr val="000000"/>
+          </a:solidFill>
+          <a:ln w="12700" cap="flat" cmpd="sng" algn="ctr">
+            <a:noFill/>
+            <a:prstDash val="solid"/>
+            <a:round/>
+            <a:headEnd type="none" w="med" len="med"/>
+            <a:tailEnd type="none" w="med" len="med"/>
+          </a:ln>
+          <a:effectLst/>
+        </p:spPr>
+        <p:txBody>
+          <a:bodyPr vert="horz" wrap="none" lIns="72000" tIns="45720" rIns="72000" bIns="45720" numCol="1" rtlCol="0" anchor="t" anchorCtr="0" compatLnSpc="1">
+            <a:prstTxWarp prst="textNoShape">
+              <a:avLst/>
+            </a:prstTxWarp>
+          </a:bodyPr>
+          <a:lstStyle/>
+          <a:p>
+            <a:endParaRPr lang="en-US"/>
+          </a:p>
+        </p:txBody>
+      </p:sp>
+      <p:sp>
+        <p:nvSpPr>
           <p:cNvPr id="2" name="Content Placeholder 1"/>
           <p:cNvSpPr>
             <a:spLocks noGrp="1"/>
@@ -11294,148 +11368,6 @@
               <a:rPr lang="en-US" dirty="0"/>
               <a:t>.</a:t>
             </a:r>
-            <a:br>
-              <a:rPr lang="en-US" dirty="0"/>
-            </a:br>
-            <a:br>
-              <a:rPr lang="en-US" dirty="0">
-                <a:latin typeface="Consolas" panose="020B0609020204030204" pitchFamily="49" charset="0"/>
-                <a:cs typeface="Consolas" panose="020B0609020204030204" pitchFamily="49" charset="0"/>
-              </a:rPr>
-            </a:br>
-            <a:r>
-              <a:rPr lang="en-US" dirty="0" err="1">
-                <a:latin typeface="Consolas" panose="020B0609020204030204" pitchFamily="49" charset="0"/>
-                <a:cs typeface="Consolas" panose="020B0609020204030204" pitchFamily="49" charset="0"/>
-              </a:rPr>
-              <a:t>meck:new</a:t>
-            </a:r>
-            <a:r>
-              <a:rPr lang="en-US" dirty="0">
-                <a:latin typeface="Consolas" panose="020B0609020204030204" pitchFamily="49" charset="0"/>
-                <a:cs typeface="Consolas" panose="020B0609020204030204" pitchFamily="49" charset="0"/>
-              </a:rPr>
-              <a:t>(</a:t>
-            </a:r>
-            <a:r>
-              <a:rPr lang="en-US" dirty="0" err="1">
-                <a:latin typeface="Consolas" panose="020B0609020204030204" pitchFamily="49" charset="0"/>
-                <a:cs typeface="Consolas" panose="020B0609020204030204" pitchFamily="49" charset="0"/>
-              </a:rPr>
-              <a:t>better_lists</a:t>
-            </a:r>
-            <a:r>
-              <a:rPr lang="en-US" dirty="0">
-                <a:latin typeface="Consolas" panose="020B0609020204030204" pitchFamily="49" charset="0"/>
-                <a:cs typeface="Consolas" panose="020B0609020204030204" pitchFamily="49" charset="0"/>
-              </a:rPr>
-              <a:t>, [</a:t>
-            </a:r>
-            <a:r>
-              <a:rPr lang="en-US" dirty="0" err="1">
-                <a:latin typeface="Consolas" panose="020B0609020204030204" pitchFamily="49" charset="0"/>
-                <a:cs typeface="Consolas" panose="020B0609020204030204" pitchFamily="49" charset="0"/>
-              </a:rPr>
-              <a:t>non_strict</a:t>
-            </a:r>
-            <a:r>
-              <a:rPr lang="en-US" dirty="0">
-                <a:latin typeface="Consolas" panose="020B0609020204030204" pitchFamily="49" charset="0"/>
-                <a:cs typeface="Consolas" panose="020B0609020204030204" pitchFamily="49" charset="0"/>
-              </a:rPr>
-              <a:t>]),</a:t>
-            </a:r>
-            <a:br>
-              <a:rPr lang="en-US" dirty="0">
-                <a:latin typeface="Consolas" panose="020B0609020204030204" pitchFamily="49" charset="0"/>
-                <a:cs typeface="Consolas" panose="020B0609020204030204" pitchFamily="49" charset="0"/>
-              </a:rPr>
-            </a:br>
-            <a:r>
-              <a:rPr lang="en-US" dirty="0" err="1">
-                <a:latin typeface="Consolas" panose="020B0609020204030204" pitchFamily="49" charset="0"/>
-                <a:cs typeface="Consolas" panose="020B0609020204030204" pitchFamily="49" charset="0"/>
-              </a:rPr>
-              <a:t>meck:expect</a:t>
-            </a:r>
-            <a:r>
-              <a:rPr lang="en-US" dirty="0">
-                <a:latin typeface="Consolas" panose="020B0609020204030204" pitchFamily="49" charset="0"/>
-                <a:cs typeface="Consolas" panose="020B0609020204030204" pitchFamily="49" charset="0"/>
-              </a:rPr>
-              <a:t>(</a:t>
-            </a:r>
-            <a:r>
-              <a:rPr lang="en-US" dirty="0" err="1">
-                <a:latin typeface="Consolas" panose="020B0609020204030204" pitchFamily="49" charset="0"/>
-                <a:cs typeface="Consolas" panose="020B0609020204030204" pitchFamily="49" charset="0"/>
-              </a:rPr>
-              <a:t>better_lists</a:t>
-            </a:r>
-            <a:r>
-              <a:rPr lang="en-US" dirty="0">
-                <a:latin typeface="Consolas" panose="020B0609020204030204" pitchFamily="49" charset="0"/>
-                <a:cs typeface="Consolas" panose="020B0609020204030204" pitchFamily="49" charset="0"/>
-              </a:rPr>
-              <a:t>,</a:t>
-            </a:r>
-            <a:br>
-              <a:rPr lang="en-US" dirty="0">
-                <a:latin typeface="Consolas" panose="020B0609020204030204" pitchFamily="49" charset="0"/>
-                <a:cs typeface="Consolas" panose="020B0609020204030204" pitchFamily="49" charset="0"/>
-              </a:rPr>
-            </a:br>
-            <a:r>
-              <a:rPr lang="en-US" dirty="0">
-                <a:latin typeface="Consolas" panose="020B0609020204030204" pitchFamily="49" charset="0"/>
-                <a:cs typeface="Consolas" panose="020B0609020204030204" pitchFamily="49" charset="0"/>
-              </a:rPr>
-              <a:t>            </a:t>
-            </a:r>
-            <a:r>
-              <a:rPr lang="en-US" dirty="0" err="1">
-                <a:latin typeface="Consolas" panose="020B0609020204030204" pitchFamily="49" charset="0"/>
-                <a:cs typeface="Consolas" panose="020B0609020204030204" pitchFamily="49" charset="0"/>
-              </a:rPr>
-              <a:t>better_sort</a:t>
-            </a:r>
-            <a:r>
-              <a:rPr lang="en-US" dirty="0">
-                <a:latin typeface="Consolas" panose="020B0609020204030204" pitchFamily="49" charset="0"/>
-                <a:cs typeface="Consolas" panose="020B0609020204030204" pitchFamily="49" charset="0"/>
-              </a:rPr>
-              <a:t>,</a:t>
-            </a:r>
-            <a:br>
-              <a:rPr lang="en-US" dirty="0">
-                <a:latin typeface="Consolas" panose="020B0609020204030204" pitchFamily="49" charset="0"/>
-                <a:cs typeface="Consolas" panose="020B0609020204030204" pitchFamily="49" charset="0"/>
-              </a:rPr>
-            </a:br>
-            <a:r>
-              <a:rPr lang="en-US" dirty="0">
-                <a:latin typeface="Consolas" panose="020B0609020204030204" pitchFamily="49" charset="0"/>
-                <a:cs typeface="Consolas" panose="020B0609020204030204" pitchFamily="49" charset="0"/>
-              </a:rPr>
-              <a:t>            fun </a:t>
-            </a:r>
-            <a:r>
-              <a:rPr lang="en-US" dirty="0" err="1">
-                <a:latin typeface="Consolas" panose="020B0609020204030204" pitchFamily="49" charset="0"/>
-                <a:cs typeface="Consolas" panose="020B0609020204030204" pitchFamily="49" charset="0"/>
-              </a:rPr>
-              <a:t>super_quicksort</a:t>
-            </a:r>
-            <a:r>
-              <a:rPr lang="en-US" dirty="0">
-                <a:latin typeface="Consolas" panose="020B0609020204030204" pitchFamily="49" charset="0"/>
-                <a:cs typeface="Consolas" panose="020B0609020204030204" pitchFamily="49" charset="0"/>
-              </a:rPr>
-              <a:t>/1).</a:t>
-            </a:r>
-          </a:p>
-          <a:p>
-            <a:endParaRPr lang="en-US" dirty="0"/>
           </a:p>
         </p:txBody>
       </p:sp>
@@ -11487,10 +11419,436 @@
           </a:p>
         </p:txBody>
       </p:sp>
+      <p:pic>
+        <p:nvPicPr>
+          <p:cNvPr id="4" name="Picture 3"/>
+          <p:cNvPicPr>
+            <a:picLocks noChangeAspect="1"/>
+          </p:cNvPicPr>
+          <p:nvPr/>
+        </p:nvPicPr>
+        <p:blipFill>
+          <a:blip r:embed="rId2"/>
+          <a:stretch>
+            <a:fillRect/>
+          </a:stretch>
+        </p:blipFill>
+        <p:spPr>
+          <a:xfrm>
+            <a:off x="2124075" y="3428999"/>
+            <a:ext cx="7943850" cy="923925"/>
+          </a:xfrm>
+          <a:prstGeom prst="rect">
+            <a:avLst/>
+          </a:prstGeom>
+        </p:spPr>
+      </p:pic>
     </p:spTree>
     <p:extLst>
       <p:ext uri="{BB962C8B-B14F-4D97-AF65-F5344CB8AC3E}">
         <p14:creationId xmlns:p14="http://schemas.microsoft.com/office/powerpoint/2010/main" val="394629017"/>
+      </p:ext>
+    </p:extLst>
+  </p:cSld>
+  <p:clrMapOvr>
+    <a:masterClrMapping/>
+  </p:clrMapOvr>
+</p:sld>
+</file>
+
+<file path=ppt/slides/slide35.xml><?xml version="1.0" encoding="utf-8"?>
+<p:sld xmlns:a="http://schemas.openxmlformats.org/drawingml/2006/main" xmlns:r="http://schemas.openxmlformats.org/officeDocument/2006/relationships" xmlns:p="http://schemas.openxmlformats.org/presentationml/2006/main">
+  <p:cSld>
+    <p:spTree>
+      <p:nvGrpSpPr>
+        <p:cNvPr id="1" name=""/>
+        <p:cNvGrpSpPr/>
+        <p:nvPr/>
+      </p:nvGrpSpPr>
+      <p:grpSpPr>
+        <a:xfrm>
+          <a:off x="0" y="0"/>
+          <a:ext cx="0" cy="0"/>
+          <a:chOff x="0" y="0"/>
+          <a:chExt cx="0" cy="0"/>
+        </a:xfrm>
+      </p:grpSpPr>
+      <p:sp>
+        <p:nvSpPr>
+          <p:cNvPr id="6" name="Rectangle: Rounded Corners 5"/>
+          <p:cNvSpPr/>
+          <p:nvPr/>
+        </p:nvSpPr>
+        <p:spPr bwMode="auto">
+          <a:xfrm>
+            <a:off x="1049867" y="3488265"/>
+            <a:ext cx="10024533" cy="2387600"/>
+          </a:xfrm>
+          <a:prstGeom prst="roundRect">
+            <a:avLst/>
+          </a:prstGeom>
+          <a:solidFill>
+            <a:srgbClr val="000000"/>
+          </a:solidFill>
+          <a:ln w="12700" cap="flat" cmpd="sng" algn="ctr">
+            <a:noFill/>
+            <a:prstDash val="solid"/>
+            <a:round/>
+            <a:headEnd type="none" w="med" len="med"/>
+            <a:tailEnd type="none" w="med" len="med"/>
+          </a:ln>
+          <a:effectLst/>
+        </p:spPr>
+        <p:txBody>
+          <a:bodyPr vert="horz" wrap="none" lIns="72000" tIns="45720" rIns="72000" bIns="45720" numCol="1" rtlCol="0" anchor="t" anchorCtr="0" compatLnSpc="1">
+            <a:prstTxWarp prst="textNoShape">
+              <a:avLst/>
+            </a:prstTxWarp>
+          </a:bodyPr>
+          <a:lstStyle/>
+          <a:p>
+            <a:endParaRPr lang="en-US"/>
+          </a:p>
+        </p:txBody>
+      </p:sp>
+      <p:sp>
+        <p:nvSpPr>
+          <p:cNvPr id="2" name="Content Placeholder 1"/>
+          <p:cNvSpPr>
+            <a:spLocks noGrp="1"/>
+          </p:cNvSpPr>
+          <p:nvPr>
+            <p:ph idx="1"/>
+          </p:nvPr>
+        </p:nvSpPr>
+        <p:spPr/>
+        <p:txBody>
+          <a:bodyPr/>
+          <a:lstStyle/>
+          <a:p>
+            <a:r>
+              <a:rPr lang="en-US" dirty="0"/>
+              <a:t>Some modules are not possible to mock due to the fact that erlang might stop working the way you expect it to, such as the erlang (core) module.</a:t>
+            </a:r>
+          </a:p>
+          <a:p>
+            <a:r>
+              <a:rPr lang="en-US" dirty="0"/>
+              <a:t>These modules are called "sticky modules".</a:t>
+            </a:r>
+          </a:p>
+          <a:p>
+            <a:pPr marL="0" indent="0">
+              <a:buNone/>
+            </a:pPr>
+            <a:endParaRPr lang="en-US" dirty="0"/>
+          </a:p>
+          <a:p>
+            <a:pPr marL="0" indent="0">
+              <a:buNone/>
+            </a:pPr>
+            <a:endParaRPr lang="en-US" dirty="0"/>
+          </a:p>
+        </p:txBody>
+      </p:sp>
+      <p:sp>
+        <p:nvSpPr>
+          <p:cNvPr id="3" name="Title 2"/>
+          <p:cNvSpPr>
+            <a:spLocks noGrp="1"/>
+          </p:cNvSpPr>
+          <p:nvPr>
+            <p:ph type="title"/>
+          </p:nvPr>
+        </p:nvSpPr>
+        <p:spPr/>
+        <p:txBody>
+          <a:bodyPr/>
+          <a:lstStyle/>
+          <a:p>
+            <a:r>
+              <a:rPr lang="en-US" dirty="0">
+                <a:solidFill>
+                  <a:srgbClr val="007B78"/>
+                </a:solidFill>
+                <a:latin typeface="+mn-lt"/>
+                <a:ea typeface="+mn-ea"/>
+                <a:cs typeface="+mn-cs"/>
+              </a:rPr>
+              <a:t>Options – unstick</a:t>
+            </a:r>
+          </a:p>
+        </p:txBody>
+      </p:sp>
+      <p:pic>
+        <p:nvPicPr>
+          <p:cNvPr id="5" name="Picture 4"/>
+          <p:cNvPicPr>
+            <a:picLocks noChangeAspect="1"/>
+          </p:cNvPicPr>
+          <p:nvPr/>
+        </p:nvPicPr>
+        <p:blipFill>
+          <a:blip r:embed="rId2"/>
+          <a:stretch>
+            <a:fillRect/>
+          </a:stretch>
+        </p:blipFill>
+        <p:spPr>
+          <a:xfrm>
+            <a:off x="1771650" y="3680881"/>
+            <a:ext cx="8648700" cy="1866900"/>
+          </a:xfrm>
+          <a:prstGeom prst="rect">
+            <a:avLst/>
+          </a:prstGeom>
+        </p:spPr>
+      </p:pic>
+      <p:sp>
+        <p:nvSpPr>
+          <p:cNvPr id="8" name="Rectangle 7"/>
+          <p:cNvSpPr/>
+          <p:nvPr/>
+        </p:nvSpPr>
+        <p:spPr bwMode="auto">
+          <a:xfrm>
+            <a:off x="1725931" y="3628771"/>
+            <a:ext cx="45719" cy="1971119"/>
+          </a:xfrm>
+          <a:prstGeom prst="rect">
+            <a:avLst/>
+          </a:prstGeom>
+          <a:solidFill>
+            <a:srgbClr val="000000"/>
+          </a:solidFill>
+          <a:ln w="12700" cap="flat" cmpd="sng" algn="ctr">
+            <a:solidFill>
+              <a:srgbClr val="000000"/>
+            </a:solidFill>
+            <a:prstDash val="solid"/>
+            <a:round/>
+            <a:headEnd type="none" w="med" len="med"/>
+            <a:tailEnd type="none" w="med" len="med"/>
+          </a:ln>
+          <a:effectLst/>
+        </p:spPr>
+        <p:txBody>
+          <a:bodyPr vert="horz" wrap="none" lIns="72000" tIns="45720" rIns="72000" bIns="45720" numCol="1" rtlCol="0" anchor="t" anchorCtr="0" compatLnSpc="1">
+            <a:prstTxWarp prst="textNoShape">
+              <a:avLst/>
+            </a:prstTxWarp>
+          </a:bodyPr>
+          <a:lstStyle/>
+          <a:p>
+            <a:pPr marL="0" marR="0" indent="0" algn="l" defTabSz="914400" rtl="0" eaLnBrk="1" fontAlgn="base" latinLnBrk="0" hangingPunct="1">
+              <a:lnSpc>
+                <a:spcPct val="100000"/>
+              </a:lnSpc>
+              <a:spcBef>
+                <a:spcPct val="50000"/>
+              </a:spcBef>
+              <a:spcAft>
+                <a:spcPct val="0"/>
+              </a:spcAft>
+              <a:buClrTx/>
+              <a:buSzTx/>
+              <a:buFontTx/>
+              <a:buNone/>
+              <a:tabLst/>
+            </a:pPr>
+            <a:endParaRPr kumimoji="0" lang="en-US" sz="2000" b="0" i="0" u="none" strike="noStrike" cap="none" normalizeH="0" baseline="0">
+              <a:ln>
+                <a:noFill/>
+              </a:ln>
+              <a:solidFill>
+                <a:schemeClr val="tx1"/>
+              </a:solidFill>
+              <a:effectLst/>
+              <a:latin typeface="Arial" charset="0"/>
+            </a:endParaRPr>
+          </a:p>
+        </p:txBody>
+      </p:sp>
+    </p:spTree>
+    <p:extLst>
+      <p:ext uri="{BB962C8B-B14F-4D97-AF65-F5344CB8AC3E}">
+        <p14:creationId xmlns:p14="http://schemas.microsoft.com/office/powerpoint/2010/main" val="3630001417"/>
+      </p:ext>
+    </p:extLst>
+  </p:cSld>
+  <p:clrMapOvr>
+    <a:masterClrMapping/>
+  </p:clrMapOvr>
+</p:sld>
+</file>
+
+<file path=ppt/slides/slide36.xml><?xml version="1.0" encoding="utf-8"?>
+<p:sld xmlns:a="http://schemas.openxmlformats.org/drawingml/2006/main" xmlns:r="http://schemas.openxmlformats.org/officeDocument/2006/relationships" xmlns:p="http://schemas.openxmlformats.org/presentationml/2006/main">
+  <p:cSld>
+    <p:spTree>
+      <p:nvGrpSpPr>
+        <p:cNvPr id="1" name=""/>
+        <p:cNvGrpSpPr/>
+        <p:nvPr/>
+      </p:nvGrpSpPr>
+      <p:grpSpPr>
+        <a:xfrm>
+          <a:off x="0" y="0"/>
+          <a:ext cx="0" cy="0"/>
+          <a:chOff x="0" y="0"/>
+          <a:chExt cx="0" cy="0"/>
+        </a:xfrm>
+      </p:grpSpPr>
+      <p:sp>
+        <p:nvSpPr>
+          <p:cNvPr id="6" name="Rectangle: Rounded Corners 5"/>
+          <p:cNvSpPr/>
+          <p:nvPr/>
+        </p:nvSpPr>
+        <p:spPr bwMode="auto">
+          <a:xfrm>
+            <a:off x="524935" y="3725331"/>
+            <a:ext cx="11140018" cy="2163735"/>
+          </a:xfrm>
+          <a:prstGeom prst="roundRect">
+            <a:avLst/>
+          </a:prstGeom>
+          <a:solidFill>
+            <a:srgbClr val="000000"/>
+          </a:solidFill>
+          <a:ln w="12700" cap="flat" cmpd="sng" algn="ctr">
+            <a:noFill/>
+            <a:prstDash val="solid"/>
+            <a:round/>
+            <a:headEnd type="none" w="med" len="med"/>
+            <a:tailEnd type="none" w="med" len="med"/>
+          </a:ln>
+          <a:effectLst/>
+        </p:spPr>
+        <p:txBody>
+          <a:bodyPr vert="horz" wrap="none" lIns="72000" tIns="45720" rIns="72000" bIns="45720" numCol="1" rtlCol="0" anchor="t" anchorCtr="0" compatLnSpc="1">
+            <a:prstTxWarp prst="textNoShape">
+              <a:avLst/>
+            </a:prstTxWarp>
+          </a:bodyPr>
+          <a:lstStyle/>
+          <a:p>
+            <a:endParaRPr lang="en-US"/>
+          </a:p>
+        </p:txBody>
+      </p:sp>
+      <p:sp>
+        <p:nvSpPr>
+          <p:cNvPr id="2" name="Content Placeholder 1"/>
+          <p:cNvSpPr>
+            <a:spLocks noGrp="1"/>
+          </p:cNvSpPr>
+          <p:nvPr>
+            <p:ph idx="1"/>
+          </p:nvPr>
+        </p:nvSpPr>
+        <p:spPr/>
+        <p:txBody>
+          <a:bodyPr/>
+          <a:lstStyle/>
+          <a:p>
+            <a:r>
+              <a:rPr lang="en-US" dirty="0"/>
+              <a:t>Except we can mock them anyway! The unstick option must be used in </a:t>
+            </a:r>
+            <a:r>
+              <a:rPr lang="en-US" dirty="0" err="1"/>
+              <a:t>meck:new</a:t>
+            </a:r>
+            <a:r>
+              <a:rPr lang="en-US" dirty="0"/>
+              <a:t>/2.</a:t>
+            </a:r>
+          </a:p>
+          <a:p>
+            <a:r>
+              <a:rPr lang="en-US" dirty="0"/>
+              <a:t>Be careful. There is a reason these modules are sticky.</a:t>
+            </a:r>
+            <a:br>
+              <a:rPr lang="en-US" dirty="0"/>
+            </a:br>
+            <a:r>
+              <a:rPr lang="en-US" dirty="0"/>
+              <a:t>You might break something.</a:t>
+            </a:r>
+          </a:p>
+          <a:p>
+            <a:pPr marL="0" indent="0">
+              <a:buNone/>
+            </a:pPr>
+            <a:endParaRPr lang="en-US" dirty="0"/>
+          </a:p>
+          <a:p>
+            <a:pPr marL="0" indent="0">
+              <a:buNone/>
+            </a:pPr>
+            <a:endParaRPr lang="en-US" dirty="0"/>
+          </a:p>
+        </p:txBody>
+      </p:sp>
+      <p:sp>
+        <p:nvSpPr>
+          <p:cNvPr id="3" name="Title 2"/>
+          <p:cNvSpPr>
+            <a:spLocks noGrp="1"/>
+          </p:cNvSpPr>
+          <p:nvPr>
+            <p:ph type="title"/>
+          </p:nvPr>
+        </p:nvSpPr>
+        <p:spPr/>
+        <p:txBody>
+          <a:bodyPr/>
+          <a:lstStyle/>
+          <a:p>
+            <a:r>
+              <a:rPr lang="en-US" dirty="0">
+                <a:solidFill>
+                  <a:srgbClr val="007B78"/>
+                </a:solidFill>
+                <a:latin typeface="+mn-lt"/>
+                <a:ea typeface="+mn-ea"/>
+                <a:cs typeface="+mn-cs"/>
+              </a:rPr>
+              <a:t>Options – unstick</a:t>
+            </a:r>
+          </a:p>
+        </p:txBody>
+      </p:sp>
+      <p:pic>
+        <p:nvPicPr>
+          <p:cNvPr id="4" name="Picture 3"/>
+          <p:cNvPicPr>
+            <a:picLocks noChangeAspect="1"/>
+          </p:cNvPicPr>
+          <p:nvPr/>
+        </p:nvPicPr>
+        <p:blipFill>
+          <a:blip r:embed="rId2"/>
+          <a:stretch>
+            <a:fillRect/>
+          </a:stretch>
+        </p:blipFill>
+        <p:spPr>
+          <a:xfrm>
+            <a:off x="663047" y="4152368"/>
+            <a:ext cx="10868025" cy="1533525"/>
+          </a:xfrm>
+          <a:prstGeom prst="rect">
+            <a:avLst/>
+          </a:prstGeom>
+        </p:spPr>
+      </p:pic>
+    </p:spTree>
+    <p:extLst>
+      <p:ext uri="{BB962C8B-B14F-4D97-AF65-F5344CB8AC3E}">
+        <p14:creationId xmlns:p14="http://schemas.microsoft.com/office/powerpoint/2010/main" val="2911219493"/>
       </p:ext>
     </p:extLst>
   </p:cSld>

</xml_diff>